<commit_message>
revisão Regras de negócio
</commit_message>
<xml_diff>
--- a/RegrasNegocio/RN_Requisitos.pptx
+++ b/RegrasNegocio/RN_Requisitos.pptx
@@ -9,6 +9,10 @@
     <p:sldId id="257" r:id="rId3"/>
     <p:sldId id="258" r:id="rId4"/>
     <p:sldId id="259" r:id="rId5"/>
+    <p:sldId id="261" r:id="rId6"/>
+    <p:sldId id="260" r:id="rId7"/>
+    <p:sldId id="262" r:id="rId8"/>
+    <p:sldId id="263" r:id="rId9"/>
   </p:sldIdLst>
   <p:sldSz cx="12192000" cy="6858000"/>
   <p:notesSz cx="6858000" cy="9144000"/>
@@ -107,6 +111,11 @@
       </a:defRPr>
     </a:lvl9pPr>
   </p:defaultTextStyle>
+  <p:extLst>
+    <p:ext uri="{EFAFB233-063F-42B5-8137-9DF3F51BA10A}">
+      <p15:sldGuideLst xmlns:p15="http://schemas.microsoft.com/office/powerpoint/2012/main"/>
+    </p:ext>
+  </p:extLst>
 </p:presentation>
 </file>
 
@@ -257,7 +266,7 @@
           <a:p>
             <a:fld id="{0A1764AE-7598-4101-9D63-6EC8D69CE664}" type="datetimeFigureOut">
               <a:rPr lang="pt-BR" smtClean="0"/>
-              <a:t>11/12/2023</a:t>
+              <a:t>12/12/2023</a:t>
             </a:fld>
             <a:endParaRPr lang="pt-BR"/>
           </a:p>
@@ -455,7 +464,7 @@
           <a:p>
             <a:fld id="{0A1764AE-7598-4101-9D63-6EC8D69CE664}" type="datetimeFigureOut">
               <a:rPr lang="pt-BR" smtClean="0"/>
-              <a:t>11/12/2023</a:t>
+              <a:t>12/12/2023</a:t>
             </a:fld>
             <a:endParaRPr lang="pt-BR"/>
           </a:p>
@@ -663,7 +672,7 @@
           <a:p>
             <a:fld id="{0A1764AE-7598-4101-9D63-6EC8D69CE664}" type="datetimeFigureOut">
               <a:rPr lang="pt-BR" smtClean="0"/>
-              <a:t>11/12/2023</a:t>
+              <a:t>12/12/2023</a:t>
             </a:fld>
             <a:endParaRPr lang="pt-BR"/>
           </a:p>
@@ -861,7 +870,7 @@
           <a:p>
             <a:fld id="{0A1764AE-7598-4101-9D63-6EC8D69CE664}" type="datetimeFigureOut">
               <a:rPr lang="pt-BR" smtClean="0"/>
-              <a:t>11/12/2023</a:t>
+              <a:t>12/12/2023</a:t>
             </a:fld>
             <a:endParaRPr lang="pt-BR"/>
           </a:p>
@@ -1136,7 +1145,7 @@
           <a:p>
             <a:fld id="{0A1764AE-7598-4101-9D63-6EC8D69CE664}" type="datetimeFigureOut">
               <a:rPr lang="pt-BR" smtClean="0"/>
-              <a:t>11/12/2023</a:t>
+              <a:t>12/12/2023</a:t>
             </a:fld>
             <a:endParaRPr lang="pt-BR"/>
           </a:p>
@@ -1401,7 +1410,7 @@
           <a:p>
             <a:fld id="{0A1764AE-7598-4101-9D63-6EC8D69CE664}" type="datetimeFigureOut">
               <a:rPr lang="pt-BR" smtClean="0"/>
-              <a:t>11/12/2023</a:t>
+              <a:t>12/12/2023</a:t>
             </a:fld>
             <a:endParaRPr lang="pt-BR"/>
           </a:p>
@@ -1813,7 +1822,7 @@
           <a:p>
             <a:fld id="{0A1764AE-7598-4101-9D63-6EC8D69CE664}" type="datetimeFigureOut">
               <a:rPr lang="pt-BR" smtClean="0"/>
-              <a:t>11/12/2023</a:t>
+              <a:t>12/12/2023</a:t>
             </a:fld>
             <a:endParaRPr lang="pt-BR"/>
           </a:p>
@@ -1954,7 +1963,7 @@
           <a:p>
             <a:fld id="{0A1764AE-7598-4101-9D63-6EC8D69CE664}" type="datetimeFigureOut">
               <a:rPr lang="pt-BR" smtClean="0"/>
-              <a:t>11/12/2023</a:t>
+              <a:t>12/12/2023</a:t>
             </a:fld>
             <a:endParaRPr lang="pt-BR"/>
           </a:p>
@@ -2067,7 +2076,7 @@
           <a:p>
             <a:fld id="{0A1764AE-7598-4101-9D63-6EC8D69CE664}" type="datetimeFigureOut">
               <a:rPr lang="pt-BR" smtClean="0"/>
-              <a:t>11/12/2023</a:t>
+              <a:t>12/12/2023</a:t>
             </a:fld>
             <a:endParaRPr lang="pt-BR"/>
           </a:p>
@@ -2378,7 +2387,7 @@
           <a:p>
             <a:fld id="{0A1764AE-7598-4101-9D63-6EC8D69CE664}" type="datetimeFigureOut">
               <a:rPr lang="pt-BR" smtClean="0"/>
-              <a:t>11/12/2023</a:t>
+              <a:t>12/12/2023</a:t>
             </a:fld>
             <a:endParaRPr lang="pt-BR"/>
           </a:p>
@@ -2666,7 +2675,7 @@
           <a:p>
             <a:fld id="{0A1764AE-7598-4101-9D63-6EC8D69CE664}" type="datetimeFigureOut">
               <a:rPr lang="pt-BR" smtClean="0"/>
-              <a:t>11/12/2023</a:t>
+              <a:t>12/12/2023</a:t>
             </a:fld>
             <a:endParaRPr lang="pt-BR"/>
           </a:p>
@@ -2907,7 +2916,7 @@
           <a:p>
             <a:fld id="{0A1764AE-7598-4101-9D63-6EC8D69CE664}" type="datetimeFigureOut">
               <a:rPr lang="pt-BR" smtClean="0"/>
-              <a:t>11/12/2023</a:t>
+              <a:t>12/12/2023</a:t>
             </a:fld>
             <a:endParaRPr lang="pt-BR"/>
           </a:p>
@@ -3490,6 +3499,36 @@
           <a:chExt cx="0" cy="0"/>
         </a:xfrm>
       </p:grpSpPr>
+      <p:pic>
+        <p:nvPicPr>
+          <p:cNvPr id="12" name="Imagem 11">
+            <a:extLst>
+              <a:ext uri="{FF2B5EF4-FFF2-40B4-BE49-F238E27FC236}">
+                <a16:creationId xmlns:a16="http://schemas.microsoft.com/office/drawing/2014/main" id="{B1387010-3D59-D652-A29C-C353113D94D7}"/>
+              </a:ext>
+            </a:extLst>
+          </p:cNvPr>
+          <p:cNvPicPr>
+            <a:picLocks noChangeAspect="1"/>
+          </p:cNvPicPr>
+          <p:nvPr/>
+        </p:nvPicPr>
+        <p:blipFill>
+          <a:blip r:embed="rId2"/>
+          <a:stretch>
+            <a:fillRect/>
+          </a:stretch>
+        </p:blipFill>
+        <p:spPr>
+          <a:xfrm>
+            <a:off x="899784" y="806749"/>
+            <a:ext cx="6535062" cy="5649113"/>
+          </a:xfrm>
+          <a:prstGeom prst="rect">
+            <a:avLst/>
+          </a:prstGeom>
+        </p:spPr>
+      </p:pic>
       <p:sp>
         <p:nvSpPr>
           <p:cNvPr id="4" name="Título 3">
@@ -3528,40 +3567,6 @@
       </p:sp>
       <p:pic>
         <p:nvPicPr>
-          <p:cNvPr id="7" name="Espaço Reservado para Conteúdo 6">
-            <a:extLst>
-              <a:ext uri="{FF2B5EF4-FFF2-40B4-BE49-F238E27FC236}">
-                <a16:creationId xmlns:a16="http://schemas.microsoft.com/office/drawing/2014/main" id="{BDD47DA5-0E60-BDA8-8E9D-A132DDA1E630}"/>
-              </a:ext>
-            </a:extLst>
-          </p:cNvPr>
-          <p:cNvPicPr>
-            <a:picLocks noGrp="1" noChangeAspect="1"/>
-          </p:cNvPicPr>
-          <p:nvPr>
-            <p:ph idx="1"/>
-          </p:nvPr>
-        </p:nvPicPr>
-        <p:blipFill rotWithShape="1">
-          <a:blip r:embed="rId2">
-            <a:extLst>
-              <a:ext uri="{28A0092B-C50C-407E-A947-70E740481C1C}">
-                <a14:useLocalDpi xmlns:a14="http://schemas.microsoft.com/office/drawing/2010/main" val="0"/>
-              </a:ext>
-            </a:extLst>
-          </a:blip>
-          <a:srcRect l="8617" t="14537" r="13086" b="22693"/>
-          <a:stretch/>
-        </p:blipFill>
-        <p:spPr>
-          <a:xfrm>
-            <a:off x="688769" y="688769"/>
-            <a:ext cx="6947065" cy="5472006"/>
-          </a:xfrm>
-        </p:spPr>
-      </p:pic>
-      <p:pic>
-        <p:nvPicPr>
           <p:cNvPr id="8" name="Espaço Reservado para Conteúdo 6">
             <a:extLst>
               <a:ext uri="{FF2B5EF4-FFF2-40B4-BE49-F238E27FC236}">
@@ -3575,7 +3580,7 @@
           <p:nvPr/>
         </p:nvPicPr>
         <p:blipFill rotWithShape="1">
-          <a:blip r:embed="rId2">
+          <a:blip r:embed="rId3">
             <a:extLst>
               <a:ext uri="{28A0092B-C50C-407E-A947-70E740481C1C}">
                 <a14:useLocalDpi xmlns:a14="http://schemas.microsoft.com/office/drawing/2010/main" val="0"/>
@@ -3761,14 +3766,14 @@
             <p:ph idx="1"/>
             <p:extLst>
               <p:ext uri="{D42A27DB-BD31-4B8C-83A1-F6EECF244321}">
-                <p14:modId xmlns:p14="http://schemas.microsoft.com/office/powerpoint/2010/main" val="3689565059"/>
+                <p14:modId xmlns:p14="http://schemas.microsoft.com/office/powerpoint/2010/main" val="863283126"/>
               </p:ext>
             </p:extLst>
           </p:nvPr>
         </p:nvGraphicFramePr>
         <p:xfrm>
           <a:off x="581891" y="982475"/>
-          <a:ext cx="11329060" cy="5263944"/>
+          <a:ext cx="11329060" cy="5401044"/>
         </p:xfrm>
         <a:graphic>
           <a:graphicData uri="http://schemas.openxmlformats.org/drawingml/2006/table">
@@ -3947,7 +3952,7 @@
                       </a:pPr>
                       <a:r>
                         <a:rPr lang="pt-BR" dirty="0"/>
-                        <a:t>Ao clicar em gravar.</a:t>
+                        <a:t>Ao clicar no botão gravar (final da página)</a:t>
                       </a:r>
                     </a:p>
                     <a:p>
@@ -4159,7 +4164,7 @@
                       </a:pPr>
                       <a:r>
                         <a:rPr lang="pt-BR" dirty="0"/>
-                        <a:t>Os campos ID, Qtd Estoque só devem aceitar valores inteiros ao digitar.</a:t>
+                        <a:t>Os campos ID, [Quantidade] só devem aceitar valores inteiros.</a:t>
                       </a:r>
                     </a:p>
                   </a:txBody>
@@ -4171,7 +4176,7 @@
                   </a:ext>
                 </a:extLst>
               </a:tr>
-              <a:tr h="1051620">
+              <a:tr h="736134">
                 <a:tc>
                   <a:txBody>
                     <a:bodyPr/>
@@ -4192,7 +4197,7 @@
                     <a:p>
                       <a:r>
                         <a:rPr lang="pt-BR" dirty="0"/>
-                        <a:t>Tela Requisição &gt; Campo [Qtd Estoque]</a:t>
+                        <a:t>Tela Requisição &gt; Categoria Motivo</a:t>
                       </a:r>
                     </a:p>
                   </a:txBody>
@@ -4222,15 +4227,531 @@
                       </a:pPr>
                       <a:r>
                         <a:rPr lang="pt-BR" dirty="0"/>
-                        <a:t>O campo </a:t>
+                        <a:t>Ao carregar a tela os dados da Categoria Motivo devem ser carregados da API.</a:t>
+                      </a:r>
+                    </a:p>
+                    <a:p>
+                      <a:pPr marL="0" marR="0" lvl="0" indent="0" algn="l" defTabSz="914400" rtl="0" eaLnBrk="1" fontAlgn="auto" latinLnBrk="0" hangingPunct="1">
+                        <a:lnSpc>
+                          <a:spcPct val="100000"/>
+                        </a:lnSpc>
+                        <a:spcBef>
+                          <a:spcPts val="0"/>
+                        </a:spcBef>
+                        <a:spcAft>
+                          <a:spcPts val="0"/>
+                        </a:spcAft>
+                        <a:buClrTx/>
+                        <a:buSzTx/>
+                        <a:buFontTx/>
+                        <a:buNone/>
+                        <a:tabLst/>
+                        <a:defRPr/>
+                      </a:pPr>
+                      <a:endParaRPr lang="pt-BR" dirty="0"/>
+                    </a:p>
+                    <a:p>
+                      <a:pPr marL="0" marR="0" lvl="0" indent="0" algn="l" defTabSz="914400" rtl="0" eaLnBrk="1" fontAlgn="auto" latinLnBrk="0" hangingPunct="1">
+                        <a:lnSpc>
+                          <a:spcPct val="100000"/>
+                        </a:lnSpc>
+                        <a:spcBef>
+                          <a:spcPts val="0"/>
+                        </a:spcBef>
+                        <a:spcAft>
+                          <a:spcPts val="0"/>
+                        </a:spcAft>
+                        <a:buClrTx/>
+                        <a:buSzTx/>
+                        <a:buFontTx/>
+                        <a:buNone/>
+                        <a:tabLst/>
+                        <a:defRPr/>
+                      </a:pPr>
+                      <a:r>
+                        <a:rPr lang="pt-BR" dirty="0"/>
+                        <a:t>Atenção:</a:t>
+                      </a:r>
+                    </a:p>
+                    <a:p>
+                      <a:pPr marL="0" marR="0" lvl="0" indent="0" algn="l" defTabSz="914400" rtl="0" eaLnBrk="1" fontAlgn="auto" latinLnBrk="0" hangingPunct="1">
+                        <a:lnSpc>
+                          <a:spcPct val="100000"/>
+                        </a:lnSpc>
+                        <a:spcBef>
+                          <a:spcPts val="0"/>
+                        </a:spcBef>
+                        <a:spcAft>
+                          <a:spcPts val="0"/>
+                        </a:spcAft>
+                        <a:buClrTx/>
+                        <a:buSzTx/>
+                        <a:buFontTx/>
+                        <a:buNone/>
+                        <a:tabLst/>
+                        <a:defRPr/>
+                      </a:pPr>
+                      <a:r>
+                        <a:rPr lang="pt-BR" dirty="0"/>
+                        <a:t>Para simular crie dados fakes em um arquivo dados.js dentro da pastas scripts.</a:t>
+                      </a:r>
+                    </a:p>
+                  </a:txBody>
+                  <a:tcPr/>
+                </a:tc>
+                <a:extLst>
+                  <a:ext uri="{0D108BD9-81ED-4DB2-BD59-A6C34878D82A}">
+                    <a16:rowId xmlns:a16="http://schemas.microsoft.com/office/drawing/2014/main" val="1830120596"/>
+                  </a:ext>
+                </a:extLst>
+              </a:tr>
+            </a:tbl>
+          </a:graphicData>
+        </a:graphic>
+      </p:graphicFrame>
+    </p:spTree>
+    <p:extLst>
+      <p:ext uri="{BB962C8B-B14F-4D97-AF65-F5344CB8AC3E}">
+        <p14:creationId xmlns:p14="http://schemas.microsoft.com/office/powerpoint/2010/main" val="1886775491"/>
+      </p:ext>
+    </p:extLst>
+  </p:cSld>
+  <p:clrMapOvr>
+    <a:masterClrMapping/>
+  </p:clrMapOvr>
+</p:sld>
+</file>
+
+<file path=ppt/slides/slide5.xml><?xml version="1.0" encoding="utf-8"?>
+<p:sld xmlns:a="http://schemas.openxmlformats.org/drawingml/2006/main" xmlns:r="http://schemas.openxmlformats.org/officeDocument/2006/relationships" xmlns:p="http://schemas.openxmlformats.org/presentationml/2006/main">
+  <p:cSld>
+    <p:spTree>
+      <p:nvGrpSpPr>
+        <p:cNvPr id="1" name=""/>
+        <p:cNvGrpSpPr/>
+        <p:nvPr/>
+      </p:nvGrpSpPr>
+      <p:grpSpPr>
+        <a:xfrm>
+          <a:off x="0" y="0"/>
+          <a:ext cx="0" cy="0"/>
+          <a:chOff x="0" y="0"/>
+          <a:chExt cx="0" cy="0"/>
+        </a:xfrm>
+      </p:grpSpPr>
+      <p:sp>
+        <p:nvSpPr>
+          <p:cNvPr id="4" name="Título 3">
+            <a:extLst>
+              <a:ext uri="{FF2B5EF4-FFF2-40B4-BE49-F238E27FC236}">
+                <a16:creationId xmlns:a16="http://schemas.microsoft.com/office/drawing/2014/main" id="{D9304602-DA18-FF79-71A4-C5F27D2DC39F}"/>
+              </a:ext>
+            </a:extLst>
+          </p:cNvPr>
+          <p:cNvSpPr>
+            <a:spLocks noGrp="1"/>
+          </p:cNvSpPr>
+          <p:nvPr>
+            <p:ph type="title"/>
+          </p:nvPr>
+        </p:nvSpPr>
+        <p:spPr>
+          <a:xfrm>
+            <a:off x="581891" y="178130"/>
+            <a:ext cx="10515600" cy="510639"/>
+          </a:xfrm>
+        </p:spPr>
+        <p:txBody>
+          <a:bodyPr>
+            <a:normAutofit fontScale="90000"/>
+          </a:bodyPr>
+          <a:lstStyle/>
+          <a:p>
+            <a:r>
+              <a:rPr lang="pt-BR" dirty="0"/>
+              <a:t>Regras Requisição</a:t>
+            </a:r>
+          </a:p>
+        </p:txBody>
+      </p:sp>
+      <p:graphicFrame>
+        <p:nvGraphicFramePr>
+          <p:cNvPr id="5" name="Espaço Reservado para Conteúdo 4">
+            <a:extLst>
+              <a:ext uri="{FF2B5EF4-FFF2-40B4-BE49-F238E27FC236}">
+                <a16:creationId xmlns:a16="http://schemas.microsoft.com/office/drawing/2014/main" id="{C9B707B6-AC27-6EC3-C992-67D9615B6401}"/>
+              </a:ext>
+            </a:extLst>
+          </p:cNvPr>
+          <p:cNvGraphicFramePr>
+            <a:graphicFrameLocks noGrp="1"/>
+          </p:cNvGraphicFramePr>
+          <p:nvPr>
+            <p:ph idx="1"/>
+            <p:extLst>
+              <p:ext uri="{D42A27DB-BD31-4B8C-83A1-F6EECF244321}">
+                <p14:modId xmlns:p14="http://schemas.microsoft.com/office/powerpoint/2010/main" val="2601638033"/>
+              </p:ext>
+            </p:extLst>
+          </p:nvPr>
+        </p:nvGraphicFramePr>
+        <p:xfrm>
+          <a:off x="663953" y="688769"/>
+          <a:ext cx="11329060" cy="4698548"/>
+        </p:xfrm>
+        <a:graphic>
+          <a:graphicData uri="http://schemas.openxmlformats.org/drawingml/2006/table">
+            <a:tbl>
+              <a:tblPr firstRow="1" bandRow="1">
+                <a:tableStyleId>{5C22544A-7EE6-4342-B048-85BDC9FD1C3A}</a:tableStyleId>
+              </a:tblPr>
+              <a:tblGrid>
+                <a:gridCol w="1100281">
+                  <a:extLst>
+                    <a:ext uri="{9D8B030D-6E8A-4147-A177-3AD203B41FA5}">
+                      <a16:colId xmlns:a16="http://schemas.microsoft.com/office/drawing/2014/main" val="1575778594"/>
+                    </a:ext>
+                  </a:extLst>
+                </a:gridCol>
+                <a:gridCol w="2379189">
+                  <a:extLst>
+                    <a:ext uri="{9D8B030D-6E8A-4147-A177-3AD203B41FA5}">
+                      <a16:colId xmlns:a16="http://schemas.microsoft.com/office/drawing/2014/main" val="3092702117"/>
+                    </a:ext>
+                  </a:extLst>
+                </a:gridCol>
+                <a:gridCol w="7849590">
+                  <a:extLst>
+                    <a:ext uri="{9D8B030D-6E8A-4147-A177-3AD203B41FA5}">
+                      <a16:colId xmlns:a16="http://schemas.microsoft.com/office/drawing/2014/main" val="1994429329"/>
+                    </a:ext>
+                  </a:extLst>
+                </a:gridCol>
+              </a:tblGrid>
+              <a:tr h="366103">
+                <a:tc>
+                  <a:txBody>
+                    <a:bodyPr/>
+                    <a:lstStyle/>
+                    <a:p>
+                      <a:r>
+                        <a:rPr lang="pt-BR" dirty="0"/>
+                        <a:t>RN</a:t>
+                      </a:r>
+                    </a:p>
+                  </a:txBody>
+                  <a:tcPr/>
+                </a:tc>
+                <a:tc>
+                  <a:txBody>
+                    <a:bodyPr/>
+                    <a:lstStyle/>
+                    <a:p>
+                      <a:r>
+                        <a:rPr lang="pt-BR" dirty="0"/>
+                        <a:t>Localização</a:t>
+                      </a:r>
+                    </a:p>
+                  </a:txBody>
+                  <a:tcPr/>
+                </a:tc>
+                <a:tc>
+                  <a:txBody>
+                    <a:bodyPr/>
+                    <a:lstStyle/>
+                    <a:p>
+                      <a:r>
+                        <a:rPr lang="pt-BR" dirty="0"/>
+                        <a:t>Especificação</a:t>
+                      </a:r>
+                    </a:p>
+                  </a:txBody>
+                  <a:tcPr/>
+                </a:tc>
+                <a:extLst>
+                  <a:ext uri="{0D108BD9-81ED-4DB2-BD59-A6C34878D82A}">
+                    <a16:rowId xmlns:a16="http://schemas.microsoft.com/office/drawing/2014/main" val="3451926938"/>
+                  </a:ext>
+                </a:extLst>
+              </a:tr>
+              <a:tr h="1670058">
+                <a:tc>
+                  <a:txBody>
+                    <a:bodyPr/>
+                    <a:lstStyle/>
+                    <a:p>
+                      <a:r>
+                        <a:rPr lang="pt-BR" dirty="0"/>
+                        <a:t>RN05</a:t>
+                      </a:r>
+                    </a:p>
+                  </a:txBody>
+                  <a:tcPr/>
+                </a:tc>
+                <a:tc>
+                  <a:txBody>
+                    <a:bodyPr/>
+                    <a:lstStyle/>
+                    <a:p>
+                      <a:r>
+                        <a:rPr lang="pt-BR" dirty="0"/>
+                        <a:t>Tela Requisição &gt; Motivo</a:t>
+                      </a:r>
+                    </a:p>
+                  </a:txBody>
+                  <a:tcPr/>
+                </a:tc>
+                <a:tc>
+                  <a:txBody>
+                    <a:bodyPr/>
+                    <a:lstStyle/>
+                    <a:p>
+                      <a:pPr marL="0" marR="0" lvl="0" indent="0" algn="l" defTabSz="914400" rtl="0" eaLnBrk="1" fontAlgn="auto" latinLnBrk="0" hangingPunct="1">
+                        <a:lnSpc>
+                          <a:spcPct val="100000"/>
+                        </a:lnSpc>
+                        <a:spcBef>
+                          <a:spcPts val="0"/>
+                        </a:spcBef>
+                        <a:spcAft>
+                          <a:spcPts val="0"/>
+                        </a:spcAft>
+                        <a:buClrTx/>
+                        <a:buSzTx/>
+                        <a:buFontTx/>
+                        <a:buNone/>
+                        <a:tabLst/>
+                        <a:defRPr/>
+                      </a:pPr>
+                      <a:r>
+                        <a:rPr lang="pt-BR" dirty="0"/>
+                        <a:t>Todo motivo está atrelado a uma Categoria de Motivo. Ao alterar os dados de uma categoria do motivo o campo motivo deve exibir somente os motivos da categoria selecionada.</a:t>
+                      </a:r>
+                    </a:p>
+                    <a:p>
+                      <a:pPr marL="0" marR="0" lvl="0" indent="0" algn="l" defTabSz="914400" rtl="0" eaLnBrk="1" fontAlgn="auto" latinLnBrk="0" hangingPunct="1">
+                        <a:lnSpc>
+                          <a:spcPct val="100000"/>
+                        </a:lnSpc>
+                        <a:spcBef>
+                          <a:spcPts val="0"/>
+                        </a:spcBef>
+                        <a:spcAft>
+                          <a:spcPts val="0"/>
+                        </a:spcAft>
+                        <a:buClrTx/>
+                        <a:buSzTx/>
+                        <a:buFontTx/>
+                        <a:buNone/>
+                        <a:tabLst/>
+                        <a:defRPr/>
+                      </a:pPr>
+                      <a:endParaRPr lang="pt-BR" dirty="0"/>
+                    </a:p>
+                    <a:p>
+                      <a:pPr marL="0" marR="0" lvl="0" indent="0" algn="l" defTabSz="914400" rtl="0" eaLnBrk="1" fontAlgn="auto" latinLnBrk="0" hangingPunct="1">
+                        <a:lnSpc>
+                          <a:spcPct val="100000"/>
+                        </a:lnSpc>
+                        <a:spcBef>
+                          <a:spcPts val="0"/>
+                        </a:spcBef>
+                        <a:spcAft>
+                          <a:spcPts val="0"/>
+                        </a:spcAft>
+                        <a:buClrTx/>
+                        <a:buSzTx/>
+                        <a:buFontTx/>
+                        <a:buNone/>
+                        <a:tabLst/>
+                        <a:defRPr/>
+                      </a:pPr>
+                      <a:r>
+                        <a:rPr lang="pt-BR" dirty="0"/>
+                        <a:t>Se  a categoria não estiver nenhum motivo correspondente o campo [MOTIVO] deve ficar desabilitado e com a cor de fundo cinza.</a:t>
+                      </a:r>
+                    </a:p>
+                  </a:txBody>
+                  <a:tcPr/>
+                </a:tc>
+                <a:extLst>
+                  <a:ext uri="{0D108BD9-81ED-4DB2-BD59-A6C34878D82A}">
+                    <a16:rowId xmlns:a16="http://schemas.microsoft.com/office/drawing/2014/main" val="2944139621"/>
+                  </a:ext>
+                </a:extLst>
+              </a:tr>
+              <a:tr h="1142672">
+                <a:tc>
+                  <a:txBody>
+                    <a:bodyPr/>
+                    <a:lstStyle/>
+                    <a:p>
+                      <a:r>
+                        <a:rPr lang="pt-BR" dirty="0"/>
+                        <a:t>RN06</a:t>
+                      </a:r>
+                    </a:p>
+                  </a:txBody>
+                  <a:tcPr/>
+                </a:tc>
+                <a:tc>
+                  <a:txBody>
+                    <a:bodyPr/>
+                    <a:lstStyle/>
+                    <a:p>
+                      <a:r>
+                        <a:rPr lang="pt-BR" dirty="0"/>
+                        <a:t>Tela Requisição &gt; [ ID] [Departamento]</a:t>
+                      </a:r>
+                    </a:p>
+                  </a:txBody>
+                  <a:tcPr/>
+                </a:tc>
+                <a:tc>
+                  <a:txBody>
+                    <a:bodyPr/>
+                    <a:lstStyle/>
+                    <a:p>
+                      <a:pPr marL="0" marR="0" lvl="0" indent="0" algn="l" defTabSz="914400" rtl="0" eaLnBrk="1" fontAlgn="auto" latinLnBrk="0" hangingPunct="1">
+                        <a:lnSpc>
+                          <a:spcPct val="100000"/>
+                        </a:lnSpc>
+                        <a:spcBef>
+                          <a:spcPts val="0"/>
+                        </a:spcBef>
+                        <a:spcAft>
+                          <a:spcPts val="0"/>
+                        </a:spcAft>
+                        <a:buClrTx/>
+                        <a:buSzTx/>
+                        <a:buFontTx/>
+                        <a:buNone/>
+                        <a:tabLst/>
+                        <a:defRPr/>
+                      </a:pPr>
+                      <a:r>
+                        <a:rPr lang="pt-BR" dirty="0"/>
+                        <a:t>Ao digitar um código no campo [ID] e esse existe na base de dados ou API o sistema deve exibir a descrição do departamento no campo Departamento. Se ao digitar um código, o mesmo não existir, logo a descrição deverá está vazia do campo Departamento.</a:t>
+                      </a:r>
+                    </a:p>
+                  </a:txBody>
+                  <a:tcPr/>
+                </a:tc>
+                <a:extLst>
+                  <a:ext uri="{0D108BD9-81ED-4DB2-BD59-A6C34878D82A}">
+                    <a16:rowId xmlns:a16="http://schemas.microsoft.com/office/drawing/2014/main" val="2842031093"/>
+                  </a:ext>
+                </a:extLst>
+              </a:tr>
+              <a:tr h="1406365">
+                <a:tc>
+                  <a:txBody>
+                    <a:bodyPr/>
+                    <a:lstStyle/>
+                    <a:p>
+                      <a:r>
+                        <a:rPr lang="pt-BR" dirty="0"/>
+                        <a:t>RN07</a:t>
+                      </a:r>
+                    </a:p>
+                  </a:txBody>
+                  <a:tcPr/>
+                </a:tc>
+                <a:tc>
+                  <a:txBody>
+                    <a:bodyPr/>
+                    <a:lstStyle/>
+                    <a:p>
+                      <a:pPr marL="0" marR="0" lvl="0" indent="0" algn="l" defTabSz="914400" rtl="0" eaLnBrk="1" fontAlgn="auto" latinLnBrk="0" hangingPunct="1">
+                        <a:lnSpc>
+                          <a:spcPct val="100000"/>
+                        </a:lnSpc>
+                        <a:spcBef>
+                          <a:spcPts val="0"/>
+                        </a:spcBef>
+                        <a:spcAft>
+                          <a:spcPts val="0"/>
+                        </a:spcAft>
+                        <a:buClrTx/>
+                        <a:buSzTx/>
+                        <a:buFontTx/>
+                        <a:buNone/>
+                        <a:tabLst/>
+                        <a:defRPr/>
+                      </a:pPr>
+                      <a:r>
+                        <a:rPr lang="pt-BR" dirty="0"/>
+                        <a:t>Tela Requisição &gt; [ ID </a:t>
                       </a:r>
                       <a:r>
                         <a:rPr lang="pt-BR" dirty="0" err="1"/>
-                        <a:t>qtd</a:t>
-                      </a:r>
-                      <a:r>
-                        <a:rPr lang="pt-BR" dirty="0"/>
-                        <a:t> estoque só deve aceitar valores inteiros e maior que zero.</a:t>
+                        <a:t>Fun</a:t>
+                      </a:r>
+                      <a:r>
+                        <a:rPr lang="pt-BR" dirty="0"/>
+                        <a:t>] [Nome </a:t>
+                      </a:r>
+                      <a:r>
+                        <a:rPr lang="pt-BR" dirty="0" err="1"/>
+                        <a:t>Funcionario</a:t>
+                      </a:r>
+                      <a:r>
+                        <a:rPr lang="pt-BR" dirty="0"/>
+                        <a:t>]</a:t>
+                      </a:r>
+                    </a:p>
+                  </a:txBody>
+                  <a:tcPr/>
+                </a:tc>
+                <a:tc>
+                  <a:txBody>
+                    <a:bodyPr/>
+                    <a:lstStyle/>
+                    <a:p>
+                      <a:pPr marL="0" marR="0" lvl="0" indent="0" algn="l" defTabSz="914400" rtl="0" eaLnBrk="1" fontAlgn="auto" latinLnBrk="0" hangingPunct="1">
+                        <a:lnSpc>
+                          <a:spcPct val="100000"/>
+                        </a:lnSpc>
+                        <a:spcBef>
+                          <a:spcPts val="0"/>
+                        </a:spcBef>
+                        <a:spcAft>
+                          <a:spcPts val="0"/>
+                        </a:spcAft>
+                        <a:buClrTx/>
+                        <a:buSzTx/>
+                        <a:buFontTx/>
+                        <a:buNone/>
+                        <a:tabLst/>
+                        <a:defRPr/>
+                      </a:pPr>
+                      <a:r>
+                        <a:rPr lang="pt-BR" dirty="0"/>
+                        <a:t>Ao digitar um código no campo ID </a:t>
+                      </a:r>
+                      <a:r>
+                        <a:rPr lang="pt-BR" dirty="0" err="1"/>
+                        <a:t>Func</a:t>
+                      </a:r>
+                      <a:r>
+                        <a:rPr lang="pt-BR" dirty="0"/>
+                        <a:t> e esse existe na base de dados ou API o sistema deve exibir o nome do funcionário no campo [Nome  </a:t>
+                      </a:r>
+                      <a:r>
+                        <a:rPr lang="pt-BR" dirty="0" err="1"/>
+                        <a:t>Funcionario</a:t>
+                      </a:r>
+                      <a:r>
+                        <a:rPr lang="pt-BR" dirty="0"/>
+                        <a:t>]. Se ao digitar um código, o mesmo não existir, logo o campo [Nome </a:t>
+                      </a:r>
+                      <a:r>
+                        <a:rPr lang="pt-BR" dirty="0" err="1"/>
+                        <a:t>Funcionario</a:t>
+                      </a:r>
+                      <a:r>
+                        <a:rPr lang="pt-BR" dirty="0"/>
+                        <a:t>] fica vazio.</a:t>
                       </a:r>
                     </a:p>
                   </a:txBody>
@@ -4249,7 +4770,1249 @@
     </p:spTree>
     <p:extLst>
       <p:ext uri="{BB962C8B-B14F-4D97-AF65-F5344CB8AC3E}">
-        <p14:creationId xmlns:p14="http://schemas.microsoft.com/office/powerpoint/2010/main" val="1886775491"/>
+        <p14:creationId xmlns:p14="http://schemas.microsoft.com/office/powerpoint/2010/main" val="1008835257"/>
+      </p:ext>
+    </p:extLst>
+  </p:cSld>
+  <p:clrMapOvr>
+    <a:masterClrMapping/>
+  </p:clrMapOvr>
+</p:sld>
+</file>
+
+<file path=ppt/slides/slide6.xml><?xml version="1.0" encoding="utf-8"?>
+<p:sld xmlns:a="http://schemas.openxmlformats.org/drawingml/2006/main" xmlns:r="http://schemas.openxmlformats.org/officeDocument/2006/relationships" xmlns:p="http://schemas.openxmlformats.org/presentationml/2006/main">
+  <p:cSld>
+    <p:spTree>
+      <p:nvGrpSpPr>
+        <p:cNvPr id="1" name=""/>
+        <p:cNvGrpSpPr/>
+        <p:nvPr/>
+      </p:nvGrpSpPr>
+      <p:grpSpPr>
+        <a:xfrm>
+          <a:off x="0" y="0"/>
+          <a:ext cx="0" cy="0"/>
+          <a:chOff x="0" y="0"/>
+          <a:chExt cx="0" cy="0"/>
+        </a:xfrm>
+      </p:grpSpPr>
+      <p:sp>
+        <p:nvSpPr>
+          <p:cNvPr id="4" name="Título 3">
+            <a:extLst>
+              <a:ext uri="{FF2B5EF4-FFF2-40B4-BE49-F238E27FC236}">
+                <a16:creationId xmlns:a16="http://schemas.microsoft.com/office/drawing/2014/main" id="{D9304602-DA18-FF79-71A4-C5F27D2DC39F}"/>
+              </a:ext>
+            </a:extLst>
+          </p:cNvPr>
+          <p:cNvSpPr>
+            <a:spLocks noGrp="1"/>
+          </p:cNvSpPr>
+          <p:nvPr>
+            <p:ph type="title"/>
+          </p:nvPr>
+        </p:nvSpPr>
+        <p:spPr>
+          <a:xfrm>
+            <a:off x="581891" y="178130"/>
+            <a:ext cx="10515600" cy="510639"/>
+          </a:xfrm>
+        </p:spPr>
+        <p:txBody>
+          <a:bodyPr>
+            <a:normAutofit fontScale="90000"/>
+          </a:bodyPr>
+          <a:lstStyle/>
+          <a:p>
+            <a:r>
+              <a:rPr lang="pt-BR" dirty="0"/>
+              <a:t>Regras Requisição</a:t>
+            </a:r>
+          </a:p>
+        </p:txBody>
+      </p:sp>
+      <p:graphicFrame>
+        <p:nvGraphicFramePr>
+          <p:cNvPr id="5" name="Espaço Reservado para Conteúdo 4">
+            <a:extLst>
+              <a:ext uri="{FF2B5EF4-FFF2-40B4-BE49-F238E27FC236}">
+                <a16:creationId xmlns:a16="http://schemas.microsoft.com/office/drawing/2014/main" id="{C9B707B6-AC27-6EC3-C992-67D9615B6401}"/>
+              </a:ext>
+            </a:extLst>
+          </p:cNvPr>
+          <p:cNvGraphicFramePr>
+            <a:graphicFrameLocks noGrp="1"/>
+          </p:cNvGraphicFramePr>
+          <p:nvPr>
+            <p:ph idx="1"/>
+            <p:extLst>
+              <p:ext uri="{D42A27DB-BD31-4B8C-83A1-F6EECF244321}">
+                <p14:modId xmlns:p14="http://schemas.microsoft.com/office/powerpoint/2010/main" val="946322543"/>
+              </p:ext>
+            </p:extLst>
+          </p:nvPr>
+        </p:nvGraphicFramePr>
+        <p:xfrm>
+          <a:off x="581891" y="982475"/>
+          <a:ext cx="11329060" cy="5126724"/>
+        </p:xfrm>
+        <a:graphic>
+          <a:graphicData uri="http://schemas.openxmlformats.org/drawingml/2006/table">
+            <a:tbl>
+              <a:tblPr firstRow="1" bandRow="1">
+                <a:tableStyleId>{5C22544A-7EE6-4342-B048-85BDC9FD1C3A}</a:tableStyleId>
+              </a:tblPr>
+              <a:tblGrid>
+                <a:gridCol w="1100281">
+                  <a:extLst>
+                    <a:ext uri="{9D8B030D-6E8A-4147-A177-3AD203B41FA5}">
+                      <a16:colId xmlns:a16="http://schemas.microsoft.com/office/drawing/2014/main" val="1575778594"/>
+                    </a:ext>
+                  </a:extLst>
+                </a:gridCol>
+                <a:gridCol w="2379189">
+                  <a:extLst>
+                    <a:ext uri="{9D8B030D-6E8A-4147-A177-3AD203B41FA5}">
+                      <a16:colId xmlns:a16="http://schemas.microsoft.com/office/drawing/2014/main" val="3092702117"/>
+                    </a:ext>
+                  </a:extLst>
+                </a:gridCol>
+                <a:gridCol w="7849590">
+                  <a:extLst>
+                    <a:ext uri="{9D8B030D-6E8A-4147-A177-3AD203B41FA5}">
+                      <a16:colId xmlns:a16="http://schemas.microsoft.com/office/drawing/2014/main" val="1994429329"/>
+                    </a:ext>
+                  </a:extLst>
+                </a:gridCol>
+              </a:tblGrid>
+              <a:tr h="426491">
+                <a:tc>
+                  <a:txBody>
+                    <a:bodyPr/>
+                    <a:lstStyle/>
+                    <a:p>
+                      <a:r>
+                        <a:rPr lang="pt-BR" dirty="0"/>
+                        <a:t>RN</a:t>
+                      </a:r>
+                    </a:p>
+                  </a:txBody>
+                  <a:tcPr/>
+                </a:tc>
+                <a:tc>
+                  <a:txBody>
+                    <a:bodyPr/>
+                    <a:lstStyle/>
+                    <a:p>
+                      <a:r>
+                        <a:rPr lang="pt-BR" dirty="0"/>
+                        <a:t>Localização</a:t>
+                      </a:r>
+                    </a:p>
+                  </a:txBody>
+                  <a:tcPr/>
+                </a:tc>
+                <a:tc>
+                  <a:txBody>
+                    <a:bodyPr/>
+                    <a:lstStyle/>
+                    <a:p>
+                      <a:r>
+                        <a:rPr lang="pt-BR" dirty="0"/>
+                        <a:t>Especificação</a:t>
+                      </a:r>
+                    </a:p>
+                  </a:txBody>
+                  <a:tcPr/>
+                </a:tc>
+                <a:extLst>
+                  <a:ext uri="{0D108BD9-81ED-4DB2-BD59-A6C34878D82A}">
+                    <a16:rowId xmlns:a16="http://schemas.microsoft.com/office/drawing/2014/main" val="3451926938"/>
+                  </a:ext>
+                </a:extLst>
+              </a:tr>
+              <a:tr h="2313565">
+                <a:tc>
+                  <a:txBody>
+                    <a:bodyPr/>
+                    <a:lstStyle/>
+                    <a:p>
+                      <a:r>
+                        <a:rPr lang="pt-BR" dirty="0"/>
+                        <a:t>RN08</a:t>
+                      </a:r>
+                    </a:p>
+                  </a:txBody>
+                  <a:tcPr/>
+                </a:tc>
+                <a:tc>
+                  <a:txBody>
+                    <a:bodyPr/>
+                    <a:lstStyle/>
+                    <a:p>
+                      <a:pPr marL="0" marR="0" lvl="0" indent="0" algn="l" defTabSz="914400" rtl="0" eaLnBrk="1" fontAlgn="auto" latinLnBrk="0" hangingPunct="1">
+                        <a:lnSpc>
+                          <a:spcPct val="100000"/>
+                        </a:lnSpc>
+                        <a:spcBef>
+                          <a:spcPts val="0"/>
+                        </a:spcBef>
+                        <a:spcAft>
+                          <a:spcPts val="0"/>
+                        </a:spcAft>
+                        <a:buClrTx/>
+                        <a:buSzTx/>
+                        <a:buFontTx/>
+                        <a:buNone/>
+                        <a:tabLst/>
+                        <a:defRPr/>
+                      </a:pPr>
+                      <a:r>
+                        <a:rPr lang="pt-BR" dirty="0"/>
+                        <a:t>Tela Requisição &gt; [ ID] [</a:t>
+                      </a:r>
+                      <a:r>
+                        <a:rPr lang="pt-BR" dirty="0" err="1"/>
+                        <a:t>Descricao</a:t>
+                      </a:r>
+                      <a:r>
+                        <a:rPr lang="pt-BR" dirty="0"/>
+                        <a:t> Produto] [Estoque]</a:t>
+                      </a:r>
+                    </a:p>
+                  </a:txBody>
+                  <a:tcPr/>
+                </a:tc>
+                <a:tc>
+                  <a:txBody>
+                    <a:bodyPr/>
+                    <a:lstStyle/>
+                    <a:p>
+                      <a:pPr marL="0" marR="0" lvl="0" indent="0" algn="l" defTabSz="914400" rtl="0" eaLnBrk="1" fontAlgn="auto" latinLnBrk="0" hangingPunct="1">
+                        <a:lnSpc>
+                          <a:spcPct val="100000"/>
+                        </a:lnSpc>
+                        <a:spcBef>
+                          <a:spcPts val="0"/>
+                        </a:spcBef>
+                        <a:spcAft>
+                          <a:spcPts val="0"/>
+                        </a:spcAft>
+                        <a:buClrTx/>
+                        <a:buSzTx/>
+                        <a:buFontTx/>
+                        <a:buNone/>
+                        <a:tabLst/>
+                        <a:defRPr/>
+                      </a:pPr>
+                      <a:r>
+                        <a:rPr lang="pt-BR" dirty="0"/>
+                        <a:t>Ao digitar um código no campo </a:t>
+                      </a:r>
+                      <a:r>
+                        <a:rPr lang="pt-BR" dirty="0" err="1"/>
+                        <a:t>Cod</a:t>
+                      </a:r>
+                      <a:r>
+                        <a:rPr lang="pt-BR" dirty="0"/>
+                        <a:t> Produto e esse existe na base de dados ou API o sistema deve exibir o nome do Produto e no campo [Estoque] a quantidade de itens em seu estoque. Se o código não existir, os campos Descrição do Produto e Estoque devem ficar em brancos.</a:t>
+                      </a:r>
+                    </a:p>
+                  </a:txBody>
+                  <a:tcPr/>
+                </a:tc>
+                <a:extLst>
+                  <a:ext uri="{0D108BD9-81ED-4DB2-BD59-A6C34878D82A}">
+                    <a16:rowId xmlns:a16="http://schemas.microsoft.com/office/drawing/2014/main" val="3319175315"/>
+                  </a:ext>
+                </a:extLst>
+              </a:tr>
+              <a:tr h="736134">
+                <a:tc>
+                  <a:txBody>
+                    <a:bodyPr/>
+                    <a:lstStyle/>
+                    <a:p>
+                      <a:r>
+                        <a:rPr lang="pt-BR" dirty="0"/>
+                        <a:t>RN09</a:t>
+                      </a:r>
+                    </a:p>
+                  </a:txBody>
+                  <a:tcPr/>
+                </a:tc>
+                <a:tc>
+                  <a:txBody>
+                    <a:bodyPr/>
+                    <a:lstStyle/>
+                    <a:p>
+                      <a:pPr marL="0" marR="0" lvl="0" indent="0" algn="l" defTabSz="914400" rtl="0" eaLnBrk="1" fontAlgn="auto" latinLnBrk="0" hangingPunct="1">
+                        <a:lnSpc>
+                          <a:spcPct val="100000"/>
+                        </a:lnSpc>
+                        <a:spcBef>
+                          <a:spcPts val="0"/>
+                        </a:spcBef>
+                        <a:spcAft>
+                          <a:spcPts val="0"/>
+                        </a:spcAft>
+                        <a:buClrTx/>
+                        <a:buSzTx/>
+                        <a:buFontTx/>
+                        <a:buNone/>
+                        <a:tabLst/>
+                        <a:defRPr/>
+                      </a:pPr>
+                      <a:r>
+                        <a:rPr lang="pt-BR" dirty="0"/>
+                        <a:t>Tela Requisição &gt; Campo [Quantidade]</a:t>
+                      </a:r>
+                    </a:p>
+                    <a:p>
+                      <a:endParaRPr lang="pt-BR" dirty="0"/>
+                    </a:p>
+                  </a:txBody>
+                  <a:tcPr/>
+                </a:tc>
+                <a:tc>
+                  <a:txBody>
+                    <a:bodyPr/>
+                    <a:lstStyle/>
+                    <a:p>
+                      <a:pPr marL="0" marR="0" lvl="0" indent="0" algn="l" defTabSz="914400" rtl="0" eaLnBrk="1" fontAlgn="auto" latinLnBrk="0" hangingPunct="1">
+                        <a:lnSpc>
+                          <a:spcPct val="100000"/>
+                        </a:lnSpc>
+                        <a:spcBef>
+                          <a:spcPts val="0"/>
+                        </a:spcBef>
+                        <a:spcAft>
+                          <a:spcPts val="0"/>
+                        </a:spcAft>
+                        <a:buClrTx/>
+                        <a:buSzTx/>
+                        <a:buFontTx/>
+                        <a:buNone/>
+                        <a:tabLst/>
+                        <a:defRPr/>
+                      </a:pPr>
+                      <a:r>
+                        <a:rPr lang="pt-BR" dirty="0"/>
+                        <a:t>Campo quantidade só é habilitado, depois que um produto for localizado e quantidade em estoque for maior que zero.</a:t>
+                      </a:r>
+                    </a:p>
+                  </a:txBody>
+                  <a:tcPr/>
+                </a:tc>
+                <a:extLst>
+                  <a:ext uri="{0D108BD9-81ED-4DB2-BD59-A6C34878D82A}">
+                    <a16:rowId xmlns:a16="http://schemas.microsoft.com/office/drawing/2014/main" val="2842031093"/>
+                  </a:ext>
+                </a:extLst>
+              </a:tr>
+              <a:tr h="736134">
+                <a:tc>
+                  <a:txBody>
+                    <a:bodyPr/>
+                    <a:lstStyle/>
+                    <a:p>
+                      <a:r>
+                        <a:rPr lang="pt-BR" dirty="0"/>
+                        <a:t>RN10</a:t>
+                      </a:r>
+                    </a:p>
+                  </a:txBody>
+                  <a:tcPr/>
+                </a:tc>
+                <a:tc>
+                  <a:txBody>
+                    <a:bodyPr/>
+                    <a:lstStyle/>
+                    <a:p>
+                      <a:r>
+                        <a:rPr lang="pt-BR" dirty="0"/>
+                        <a:t>Tela Requisição &gt; Campo [Quantidade]</a:t>
+                      </a:r>
+                    </a:p>
+                  </a:txBody>
+                  <a:tcPr/>
+                </a:tc>
+                <a:tc>
+                  <a:txBody>
+                    <a:bodyPr/>
+                    <a:lstStyle/>
+                    <a:p>
+                      <a:pPr marL="0" marR="0" lvl="0" indent="0" algn="l" defTabSz="914400" rtl="0" eaLnBrk="1" fontAlgn="auto" latinLnBrk="0" hangingPunct="1">
+                        <a:lnSpc>
+                          <a:spcPct val="100000"/>
+                        </a:lnSpc>
+                        <a:spcBef>
+                          <a:spcPts val="0"/>
+                        </a:spcBef>
+                        <a:spcAft>
+                          <a:spcPts val="0"/>
+                        </a:spcAft>
+                        <a:buClrTx/>
+                        <a:buSzTx/>
+                        <a:buFontTx/>
+                        <a:buNone/>
+                        <a:tabLst/>
+                        <a:defRPr/>
+                      </a:pPr>
+                      <a:r>
+                        <a:rPr lang="pt-BR" dirty="0"/>
+                        <a:t>O campo Quantidade só deve aceitar valores inteiros maior que zero.</a:t>
+                      </a:r>
+                    </a:p>
+                  </a:txBody>
+                  <a:tcPr/>
+                </a:tc>
+                <a:extLst>
+                  <a:ext uri="{0D108BD9-81ED-4DB2-BD59-A6C34878D82A}">
+                    <a16:rowId xmlns:a16="http://schemas.microsoft.com/office/drawing/2014/main" val="4144478064"/>
+                  </a:ext>
+                </a:extLst>
+              </a:tr>
+              <a:tr h="736134">
+                <a:tc>
+                  <a:txBody>
+                    <a:bodyPr/>
+                    <a:lstStyle/>
+                    <a:p>
+                      <a:r>
+                        <a:rPr lang="pt-BR" dirty="0"/>
+                        <a:t>RN11</a:t>
+                      </a:r>
+                    </a:p>
+                  </a:txBody>
+                  <a:tcPr/>
+                </a:tc>
+                <a:tc>
+                  <a:txBody>
+                    <a:bodyPr/>
+                    <a:lstStyle/>
+                    <a:p>
+                      <a:r>
+                        <a:rPr lang="pt-BR" dirty="0"/>
+                        <a:t>Tela Requisição &gt; Botão Gravar</a:t>
+                      </a:r>
+                    </a:p>
+                  </a:txBody>
+                  <a:tcPr/>
+                </a:tc>
+                <a:tc>
+                  <a:txBody>
+                    <a:bodyPr/>
+                    <a:lstStyle/>
+                    <a:p>
+                      <a:pPr marL="0" marR="0" lvl="0" indent="0" algn="l" defTabSz="914400" rtl="0" eaLnBrk="1" fontAlgn="auto" latinLnBrk="0" hangingPunct="1">
+                        <a:lnSpc>
+                          <a:spcPct val="100000"/>
+                        </a:lnSpc>
+                        <a:spcBef>
+                          <a:spcPts val="0"/>
+                        </a:spcBef>
+                        <a:spcAft>
+                          <a:spcPts val="0"/>
+                        </a:spcAft>
+                        <a:buClrTx/>
+                        <a:buSzTx/>
+                        <a:buFontTx/>
+                        <a:buNone/>
+                        <a:tabLst/>
+                        <a:defRPr/>
+                      </a:pPr>
+                      <a:r>
+                        <a:rPr lang="pt-BR" dirty="0"/>
+                        <a:t>O botão gravar só deve ficar ativo depois que o valor da quantidade informada for maior que zero  e se a quantidade for menor ou igual ao valor exibido no estoque.</a:t>
+                      </a:r>
+                    </a:p>
+                  </a:txBody>
+                  <a:tcPr/>
+                </a:tc>
+                <a:extLst>
+                  <a:ext uri="{0D108BD9-81ED-4DB2-BD59-A6C34878D82A}">
+                    <a16:rowId xmlns:a16="http://schemas.microsoft.com/office/drawing/2014/main" val="2539329988"/>
+                  </a:ext>
+                </a:extLst>
+              </a:tr>
+            </a:tbl>
+          </a:graphicData>
+        </a:graphic>
+      </p:graphicFrame>
+    </p:spTree>
+    <p:extLst>
+      <p:ext uri="{BB962C8B-B14F-4D97-AF65-F5344CB8AC3E}">
+        <p14:creationId xmlns:p14="http://schemas.microsoft.com/office/powerpoint/2010/main" val="3550946030"/>
+      </p:ext>
+    </p:extLst>
+  </p:cSld>
+  <p:clrMapOvr>
+    <a:masterClrMapping/>
+  </p:clrMapOvr>
+</p:sld>
+</file>
+
+<file path=ppt/slides/slide7.xml><?xml version="1.0" encoding="utf-8"?>
+<p:sld xmlns:a="http://schemas.openxmlformats.org/drawingml/2006/main" xmlns:r="http://schemas.openxmlformats.org/officeDocument/2006/relationships" xmlns:p="http://schemas.openxmlformats.org/presentationml/2006/main">
+  <p:cSld>
+    <p:spTree>
+      <p:nvGrpSpPr>
+        <p:cNvPr id="1" name=""/>
+        <p:cNvGrpSpPr/>
+        <p:nvPr/>
+      </p:nvGrpSpPr>
+      <p:grpSpPr>
+        <a:xfrm>
+          <a:off x="0" y="0"/>
+          <a:ext cx="0" cy="0"/>
+          <a:chOff x="0" y="0"/>
+          <a:chExt cx="0" cy="0"/>
+        </a:xfrm>
+      </p:grpSpPr>
+      <p:sp>
+        <p:nvSpPr>
+          <p:cNvPr id="4" name="Título 3">
+            <a:extLst>
+              <a:ext uri="{FF2B5EF4-FFF2-40B4-BE49-F238E27FC236}">
+                <a16:creationId xmlns:a16="http://schemas.microsoft.com/office/drawing/2014/main" id="{D9304602-DA18-FF79-71A4-C5F27D2DC39F}"/>
+              </a:ext>
+            </a:extLst>
+          </p:cNvPr>
+          <p:cNvSpPr>
+            <a:spLocks noGrp="1"/>
+          </p:cNvSpPr>
+          <p:nvPr>
+            <p:ph type="title"/>
+          </p:nvPr>
+        </p:nvSpPr>
+        <p:spPr>
+          <a:xfrm>
+            <a:off x="581891" y="178130"/>
+            <a:ext cx="10515600" cy="510639"/>
+          </a:xfrm>
+        </p:spPr>
+        <p:txBody>
+          <a:bodyPr>
+            <a:normAutofit fontScale="90000"/>
+          </a:bodyPr>
+          <a:lstStyle/>
+          <a:p>
+            <a:r>
+              <a:rPr lang="pt-BR" dirty="0"/>
+              <a:t>Regras Requisição</a:t>
+            </a:r>
+          </a:p>
+        </p:txBody>
+      </p:sp>
+      <p:graphicFrame>
+        <p:nvGraphicFramePr>
+          <p:cNvPr id="5" name="Espaço Reservado para Conteúdo 4">
+            <a:extLst>
+              <a:ext uri="{FF2B5EF4-FFF2-40B4-BE49-F238E27FC236}">
+                <a16:creationId xmlns:a16="http://schemas.microsoft.com/office/drawing/2014/main" id="{C9B707B6-AC27-6EC3-C992-67D9615B6401}"/>
+              </a:ext>
+            </a:extLst>
+          </p:cNvPr>
+          <p:cNvGraphicFramePr>
+            <a:graphicFrameLocks noGrp="1"/>
+          </p:cNvGraphicFramePr>
+          <p:nvPr>
+            <p:ph idx="1"/>
+            <p:extLst>
+              <p:ext uri="{D42A27DB-BD31-4B8C-83A1-F6EECF244321}">
+                <p14:modId xmlns:p14="http://schemas.microsoft.com/office/powerpoint/2010/main" val="1569274692"/>
+              </p:ext>
+            </p:extLst>
+          </p:nvPr>
+        </p:nvGraphicFramePr>
+        <p:xfrm>
+          <a:off x="581891" y="982473"/>
+          <a:ext cx="11329060" cy="5359711"/>
+        </p:xfrm>
+        <a:graphic>
+          <a:graphicData uri="http://schemas.openxmlformats.org/drawingml/2006/table">
+            <a:tbl>
+              <a:tblPr firstRow="1" bandRow="1">
+                <a:tableStyleId>{5C22544A-7EE6-4342-B048-85BDC9FD1C3A}</a:tableStyleId>
+              </a:tblPr>
+              <a:tblGrid>
+                <a:gridCol w="1100281">
+                  <a:extLst>
+                    <a:ext uri="{9D8B030D-6E8A-4147-A177-3AD203B41FA5}">
+                      <a16:colId xmlns:a16="http://schemas.microsoft.com/office/drawing/2014/main" val="1575778594"/>
+                    </a:ext>
+                  </a:extLst>
+                </a:gridCol>
+                <a:gridCol w="2379189">
+                  <a:extLst>
+                    <a:ext uri="{9D8B030D-6E8A-4147-A177-3AD203B41FA5}">
+                      <a16:colId xmlns:a16="http://schemas.microsoft.com/office/drawing/2014/main" val="3092702117"/>
+                    </a:ext>
+                  </a:extLst>
+                </a:gridCol>
+                <a:gridCol w="7849590">
+                  <a:extLst>
+                    <a:ext uri="{9D8B030D-6E8A-4147-A177-3AD203B41FA5}">
+                      <a16:colId xmlns:a16="http://schemas.microsoft.com/office/drawing/2014/main" val="1994429329"/>
+                    </a:ext>
+                  </a:extLst>
+                </a:gridCol>
+              </a:tblGrid>
+              <a:tr h="807174">
+                <a:tc>
+                  <a:txBody>
+                    <a:bodyPr/>
+                    <a:lstStyle/>
+                    <a:p>
+                      <a:r>
+                        <a:rPr lang="pt-BR" dirty="0"/>
+                        <a:t>RN</a:t>
+                      </a:r>
+                    </a:p>
+                  </a:txBody>
+                  <a:tcPr/>
+                </a:tc>
+                <a:tc>
+                  <a:txBody>
+                    <a:bodyPr/>
+                    <a:lstStyle/>
+                    <a:p>
+                      <a:r>
+                        <a:rPr lang="pt-BR" dirty="0"/>
+                        <a:t>Localização</a:t>
+                      </a:r>
+                    </a:p>
+                  </a:txBody>
+                  <a:tcPr/>
+                </a:tc>
+                <a:tc>
+                  <a:txBody>
+                    <a:bodyPr/>
+                    <a:lstStyle/>
+                    <a:p>
+                      <a:r>
+                        <a:rPr lang="pt-BR" dirty="0"/>
+                        <a:t>Especificação</a:t>
+                      </a:r>
+                    </a:p>
+                  </a:txBody>
+                  <a:tcPr/>
+                </a:tc>
+                <a:extLst>
+                  <a:ext uri="{0D108BD9-81ED-4DB2-BD59-A6C34878D82A}">
+                    <a16:rowId xmlns:a16="http://schemas.microsoft.com/office/drawing/2014/main" val="3451926938"/>
+                  </a:ext>
+                </a:extLst>
+              </a:tr>
+              <a:tr h="2159560">
+                <a:tc>
+                  <a:txBody>
+                    <a:bodyPr/>
+                    <a:lstStyle/>
+                    <a:p>
+                      <a:r>
+                        <a:rPr lang="pt-BR" dirty="0"/>
+                        <a:t>RN12</a:t>
+                      </a:r>
+                    </a:p>
+                  </a:txBody>
+                  <a:tcPr/>
+                </a:tc>
+                <a:tc>
+                  <a:txBody>
+                    <a:bodyPr/>
+                    <a:lstStyle/>
+                    <a:p>
+                      <a:r>
+                        <a:rPr lang="pt-BR" dirty="0"/>
+                        <a:t>Tela Requisição &gt; </a:t>
+                      </a:r>
+                      <a:r>
+                        <a:rPr lang="pt-BR" dirty="0" err="1"/>
+                        <a:t>Nivel</a:t>
+                      </a:r>
+                      <a:r>
+                        <a:rPr lang="pt-BR" dirty="0"/>
+                        <a:t> Prioridade</a:t>
+                      </a:r>
+                    </a:p>
+                  </a:txBody>
+                  <a:tcPr/>
+                </a:tc>
+                <a:tc>
+                  <a:txBody>
+                    <a:bodyPr/>
+                    <a:lstStyle/>
+                    <a:p>
+                      <a:pPr marL="0" marR="0" lvl="0" indent="0" algn="l" defTabSz="914400" rtl="0" eaLnBrk="1" fontAlgn="auto" latinLnBrk="0" hangingPunct="1">
+                        <a:lnSpc>
+                          <a:spcPct val="100000"/>
+                        </a:lnSpc>
+                        <a:spcBef>
+                          <a:spcPts val="0"/>
+                        </a:spcBef>
+                        <a:spcAft>
+                          <a:spcPts val="0"/>
+                        </a:spcAft>
+                        <a:buClrTx/>
+                        <a:buSzTx/>
+                        <a:buFontTx/>
+                        <a:buNone/>
+                        <a:tabLst/>
+                        <a:defRPr/>
+                      </a:pPr>
+                      <a:r>
+                        <a:rPr lang="pt-BR" dirty="0"/>
+                        <a:t>Ao marcar um nível de prioridade esse deve mudar a cor conforme exemplo abaixo:</a:t>
+                      </a:r>
+                    </a:p>
+                    <a:p>
+                      <a:pPr marL="0" marR="0" lvl="0" indent="0" algn="l" defTabSz="914400" rtl="0" eaLnBrk="1" fontAlgn="auto" latinLnBrk="0" hangingPunct="1">
+                        <a:lnSpc>
+                          <a:spcPct val="100000"/>
+                        </a:lnSpc>
+                        <a:spcBef>
+                          <a:spcPts val="0"/>
+                        </a:spcBef>
+                        <a:spcAft>
+                          <a:spcPts val="0"/>
+                        </a:spcAft>
+                        <a:buClrTx/>
+                        <a:buSzTx/>
+                        <a:buFontTx/>
+                        <a:buNone/>
+                        <a:tabLst/>
+                        <a:defRPr/>
+                      </a:pPr>
+                      <a:endParaRPr lang="pt-BR" dirty="0"/>
+                    </a:p>
+                  </a:txBody>
+                  <a:tcPr/>
+                </a:tc>
+                <a:extLst>
+                  <a:ext uri="{0D108BD9-81ED-4DB2-BD59-A6C34878D82A}">
+                    <a16:rowId xmlns:a16="http://schemas.microsoft.com/office/drawing/2014/main" val="3319175315"/>
+                  </a:ext>
+                </a:extLst>
+              </a:tr>
+              <a:tr h="2392977">
+                <a:tc>
+                  <a:txBody>
+                    <a:bodyPr/>
+                    <a:lstStyle/>
+                    <a:p>
+                      <a:r>
+                        <a:rPr lang="pt-BR" dirty="0"/>
+                        <a:t>RN13</a:t>
+                      </a:r>
+                    </a:p>
+                  </a:txBody>
+                  <a:tcPr/>
+                </a:tc>
+                <a:tc>
+                  <a:txBody>
+                    <a:bodyPr/>
+                    <a:lstStyle/>
+                    <a:p>
+                      <a:pPr marL="0" marR="0" lvl="0" indent="0" algn="l" defTabSz="914400" rtl="0" eaLnBrk="1" fontAlgn="auto" latinLnBrk="0" hangingPunct="1">
+                        <a:lnSpc>
+                          <a:spcPct val="100000"/>
+                        </a:lnSpc>
+                        <a:spcBef>
+                          <a:spcPts val="0"/>
+                        </a:spcBef>
+                        <a:spcAft>
+                          <a:spcPts val="0"/>
+                        </a:spcAft>
+                        <a:buClrTx/>
+                        <a:buSzTx/>
+                        <a:buFontTx/>
+                        <a:buNone/>
+                        <a:tabLst/>
+                        <a:defRPr/>
+                      </a:pPr>
+                      <a:r>
+                        <a:rPr lang="pt-BR" dirty="0"/>
+                        <a:t>Tela Requisição &gt; Elemento Status Estoque</a:t>
+                      </a:r>
+                    </a:p>
+                    <a:p>
+                      <a:endParaRPr lang="pt-BR" dirty="0"/>
+                    </a:p>
+                  </a:txBody>
+                  <a:tcPr/>
+                </a:tc>
+                <a:tc>
+                  <a:txBody>
+                    <a:bodyPr/>
+                    <a:lstStyle/>
+                    <a:p>
+                      <a:pPr marL="0" marR="0" lvl="0" indent="0" algn="l" defTabSz="914400" rtl="0" eaLnBrk="1" fontAlgn="auto" latinLnBrk="0" hangingPunct="1">
+                        <a:lnSpc>
+                          <a:spcPct val="100000"/>
+                        </a:lnSpc>
+                        <a:spcBef>
+                          <a:spcPts val="0"/>
+                        </a:spcBef>
+                        <a:spcAft>
+                          <a:spcPts val="0"/>
+                        </a:spcAft>
+                        <a:buClrTx/>
+                        <a:buSzTx/>
+                        <a:buFontTx/>
+                        <a:buNone/>
+                        <a:tabLst/>
+                        <a:defRPr/>
+                      </a:pPr>
+                      <a:r>
+                        <a:rPr lang="pt-BR" dirty="0"/>
+                        <a:t>O elemento Status Estoque é o retângulo exibido ao lado do campo quantidade e deve ficar com as cores a seguir e conforme legenda.</a:t>
+                      </a:r>
+                    </a:p>
+                    <a:p>
+                      <a:pPr marL="0" marR="0" lvl="0" indent="0" algn="l" defTabSz="914400" rtl="0" eaLnBrk="1" fontAlgn="auto" latinLnBrk="0" hangingPunct="1">
+                        <a:lnSpc>
+                          <a:spcPct val="100000"/>
+                        </a:lnSpc>
+                        <a:spcBef>
+                          <a:spcPts val="0"/>
+                        </a:spcBef>
+                        <a:spcAft>
+                          <a:spcPts val="0"/>
+                        </a:spcAft>
+                        <a:buClrTx/>
+                        <a:buSzTx/>
+                        <a:buFontTx/>
+                        <a:buNone/>
+                        <a:tabLst/>
+                        <a:defRPr/>
+                      </a:pPr>
+                      <a:endParaRPr lang="pt-BR" dirty="0"/>
+                    </a:p>
+                  </a:txBody>
+                  <a:tcPr/>
+                </a:tc>
+                <a:extLst>
+                  <a:ext uri="{0D108BD9-81ED-4DB2-BD59-A6C34878D82A}">
+                    <a16:rowId xmlns:a16="http://schemas.microsoft.com/office/drawing/2014/main" val="2944139621"/>
+                  </a:ext>
+                </a:extLst>
+              </a:tr>
+            </a:tbl>
+          </a:graphicData>
+        </a:graphic>
+      </p:graphicFrame>
+      <p:pic>
+        <p:nvPicPr>
+          <p:cNvPr id="2" name="Imagem 1">
+            <a:extLst>
+              <a:ext uri="{FF2B5EF4-FFF2-40B4-BE49-F238E27FC236}">
+                <a16:creationId xmlns:a16="http://schemas.microsoft.com/office/drawing/2014/main" id="{2AD4EBDE-583B-B559-5C11-31B8D41CE245}"/>
+              </a:ext>
+            </a:extLst>
+          </p:cNvPr>
+          <p:cNvPicPr>
+            <a:picLocks noChangeAspect="1"/>
+          </p:cNvPicPr>
+          <p:nvPr/>
+        </p:nvPicPr>
+        <p:blipFill>
+          <a:blip r:embed="rId2"/>
+          <a:stretch>
+            <a:fillRect/>
+          </a:stretch>
+        </p:blipFill>
+        <p:spPr>
+          <a:xfrm>
+            <a:off x="4288327" y="2179007"/>
+            <a:ext cx="2018551" cy="683599"/>
+          </a:xfrm>
+          <a:prstGeom prst="rect">
+            <a:avLst/>
+          </a:prstGeom>
+        </p:spPr>
+      </p:pic>
+      <p:pic>
+        <p:nvPicPr>
+          <p:cNvPr id="3" name="Imagem 2">
+            <a:extLst>
+              <a:ext uri="{FF2B5EF4-FFF2-40B4-BE49-F238E27FC236}">
+                <a16:creationId xmlns:a16="http://schemas.microsoft.com/office/drawing/2014/main" id="{4D864E99-8FFE-3197-2C17-8954048B7DE8}"/>
+              </a:ext>
+            </a:extLst>
+          </p:cNvPr>
+          <p:cNvPicPr>
+            <a:picLocks noChangeAspect="1"/>
+          </p:cNvPicPr>
+          <p:nvPr/>
+        </p:nvPicPr>
+        <p:blipFill>
+          <a:blip r:embed="rId3"/>
+          <a:stretch>
+            <a:fillRect/>
+          </a:stretch>
+        </p:blipFill>
+        <p:spPr>
+          <a:xfrm>
+            <a:off x="6586326" y="2179007"/>
+            <a:ext cx="2018551" cy="714904"/>
+          </a:xfrm>
+          <a:prstGeom prst="rect">
+            <a:avLst/>
+          </a:prstGeom>
+        </p:spPr>
+      </p:pic>
+      <p:pic>
+        <p:nvPicPr>
+          <p:cNvPr id="6" name="Imagem 5">
+            <a:extLst>
+              <a:ext uri="{FF2B5EF4-FFF2-40B4-BE49-F238E27FC236}">
+                <a16:creationId xmlns:a16="http://schemas.microsoft.com/office/drawing/2014/main" id="{14CC290B-128E-E93B-055B-5B4178B43E95}"/>
+              </a:ext>
+            </a:extLst>
+          </p:cNvPr>
+          <p:cNvPicPr>
+            <a:picLocks noChangeAspect="1"/>
+          </p:cNvPicPr>
+          <p:nvPr/>
+        </p:nvPicPr>
+        <p:blipFill>
+          <a:blip r:embed="rId4"/>
+          <a:stretch>
+            <a:fillRect/>
+          </a:stretch>
+        </p:blipFill>
+        <p:spPr>
+          <a:xfrm>
+            <a:off x="8784417" y="2188747"/>
+            <a:ext cx="2563521" cy="725337"/>
+          </a:xfrm>
+          <a:prstGeom prst="rect">
+            <a:avLst/>
+          </a:prstGeom>
+        </p:spPr>
+      </p:pic>
+      <p:pic>
+        <p:nvPicPr>
+          <p:cNvPr id="10" name="Imagem 9">
+            <a:extLst>
+              <a:ext uri="{FF2B5EF4-FFF2-40B4-BE49-F238E27FC236}">
+                <a16:creationId xmlns:a16="http://schemas.microsoft.com/office/drawing/2014/main" id="{7FB24CB0-D72A-3F5A-1F1D-7E04FA297C82}"/>
+              </a:ext>
+            </a:extLst>
+          </p:cNvPr>
+          <p:cNvPicPr>
+            <a:picLocks noChangeAspect="1"/>
+          </p:cNvPicPr>
+          <p:nvPr/>
+        </p:nvPicPr>
+        <p:blipFill rotWithShape="1">
+          <a:blip r:embed="rId5"/>
+          <a:srcRect l="53144" t="40108" r="18309" b="43754"/>
+          <a:stretch/>
+        </p:blipFill>
+        <p:spPr>
+          <a:xfrm>
+            <a:off x="5439676" y="4597621"/>
+            <a:ext cx="3344741" cy="1614168"/>
+          </a:xfrm>
+          <a:prstGeom prst="rect">
+            <a:avLst/>
+          </a:prstGeom>
+        </p:spPr>
+      </p:pic>
+    </p:spTree>
+    <p:extLst>
+      <p:ext uri="{BB962C8B-B14F-4D97-AF65-F5344CB8AC3E}">
+        <p14:creationId xmlns:p14="http://schemas.microsoft.com/office/powerpoint/2010/main" val="3914244365"/>
+      </p:ext>
+    </p:extLst>
+  </p:cSld>
+  <p:clrMapOvr>
+    <a:masterClrMapping/>
+  </p:clrMapOvr>
+</p:sld>
+</file>
+
+<file path=ppt/slides/slide8.xml><?xml version="1.0" encoding="utf-8"?>
+<p:sld xmlns:a="http://schemas.openxmlformats.org/drawingml/2006/main" xmlns:r="http://schemas.openxmlformats.org/officeDocument/2006/relationships" xmlns:p="http://schemas.openxmlformats.org/presentationml/2006/main">
+  <p:cSld>
+    <p:spTree>
+      <p:nvGrpSpPr>
+        <p:cNvPr id="1" name=""/>
+        <p:cNvGrpSpPr/>
+        <p:nvPr/>
+      </p:nvGrpSpPr>
+      <p:grpSpPr>
+        <a:xfrm>
+          <a:off x="0" y="0"/>
+          <a:ext cx="0" cy="0"/>
+          <a:chOff x="0" y="0"/>
+          <a:chExt cx="0" cy="0"/>
+        </a:xfrm>
+      </p:grpSpPr>
+      <p:sp>
+        <p:nvSpPr>
+          <p:cNvPr id="4" name="Título 3">
+            <a:extLst>
+              <a:ext uri="{FF2B5EF4-FFF2-40B4-BE49-F238E27FC236}">
+                <a16:creationId xmlns:a16="http://schemas.microsoft.com/office/drawing/2014/main" id="{D9304602-DA18-FF79-71A4-C5F27D2DC39F}"/>
+              </a:ext>
+            </a:extLst>
+          </p:cNvPr>
+          <p:cNvSpPr>
+            <a:spLocks noGrp="1"/>
+          </p:cNvSpPr>
+          <p:nvPr>
+            <p:ph type="title"/>
+          </p:nvPr>
+        </p:nvSpPr>
+        <p:spPr>
+          <a:xfrm>
+            <a:off x="581891" y="178130"/>
+            <a:ext cx="10515600" cy="510639"/>
+          </a:xfrm>
+        </p:spPr>
+        <p:txBody>
+          <a:bodyPr>
+            <a:normAutofit fontScale="90000"/>
+          </a:bodyPr>
+          <a:lstStyle/>
+          <a:p>
+            <a:r>
+              <a:rPr lang="pt-BR" dirty="0"/>
+              <a:t>Regras Requisição</a:t>
+            </a:r>
+          </a:p>
+        </p:txBody>
+      </p:sp>
+      <p:graphicFrame>
+        <p:nvGraphicFramePr>
+          <p:cNvPr id="5" name="Espaço Reservado para Conteúdo 4">
+            <a:extLst>
+              <a:ext uri="{FF2B5EF4-FFF2-40B4-BE49-F238E27FC236}">
+                <a16:creationId xmlns:a16="http://schemas.microsoft.com/office/drawing/2014/main" id="{C9B707B6-AC27-6EC3-C992-67D9615B6401}"/>
+              </a:ext>
+            </a:extLst>
+          </p:cNvPr>
+          <p:cNvGraphicFramePr>
+            <a:graphicFrameLocks noGrp="1"/>
+          </p:cNvGraphicFramePr>
+          <p:nvPr>
+            <p:ph idx="1"/>
+            <p:extLst>
+              <p:ext uri="{D42A27DB-BD31-4B8C-83A1-F6EECF244321}">
+                <p14:modId xmlns:p14="http://schemas.microsoft.com/office/powerpoint/2010/main" val="3318696576"/>
+              </p:ext>
+            </p:extLst>
+          </p:nvPr>
+        </p:nvGraphicFramePr>
+        <p:xfrm>
+          <a:off x="581891" y="982472"/>
+          <a:ext cx="11329060" cy="3964665"/>
+        </p:xfrm>
+        <a:graphic>
+          <a:graphicData uri="http://schemas.openxmlformats.org/drawingml/2006/table">
+            <a:tbl>
+              <a:tblPr firstRow="1" bandRow="1">
+                <a:tableStyleId>{5C22544A-7EE6-4342-B048-85BDC9FD1C3A}</a:tableStyleId>
+              </a:tblPr>
+              <a:tblGrid>
+                <a:gridCol w="1100281">
+                  <a:extLst>
+                    <a:ext uri="{9D8B030D-6E8A-4147-A177-3AD203B41FA5}">
+                      <a16:colId xmlns:a16="http://schemas.microsoft.com/office/drawing/2014/main" val="1575778594"/>
+                    </a:ext>
+                  </a:extLst>
+                </a:gridCol>
+                <a:gridCol w="2379189">
+                  <a:extLst>
+                    <a:ext uri="{9D8B030D-6E8A-4147-A177-3AD203B41FA5}">
+                      <a16:colId xmlns:a16="http://schemas.microsoft.com/office/drawing/2014/main" val="3092702117"/>
+                    </a:ext>
+                  </a:extLst>
+                </a:gridCol>
+                <a:gridCol w="7849590">
+                  <a:extLst>
+                    <a:ext uri="{9D8B030D-6E8A-4147-A177-3AD203B41FA5}">
+                      <a16:colId xmlns:a16="http://schemas.microsoft.com/office/drawing/2014/main" val="1994429329"/>
+                    </a:ext>
+                  </a:extLst>
+                </a:gridCol>
+              </a:tblGrid>
+              <a:tr h="1078686">
+                <a:tc>
+                  <a:txBody>
+                    <a:bodyPr/>
+                    <a:lstStyle/>
+                    <a:p>
+                      <a:r>
+                        <a:rPr lang="pt-BR" dirty="0"/>
+                        <a:t>RN</a:t>
+                      </a:r>
+                    </a:p>
+                  </a:txBody>
+                  <a:tcPr/>
+                </a:tc>
+                <a:tc>
+                  <a:txBody>
+                    <a:bodyPr/>
+                    <a:lstStyle/>
+                    <a:p>
+                      <a:r>
+                        <a:rPr lang="pt-BR" dirty="0"/>
+                        <a:t>Localização</a:t>
+                      </a:r>
+                    </a:p>
+                  </a:txBody>
+                  <a:tcPr/>
+                </a:tc>
+                <a:tc>
+                  <a:txBody>
+                    <a:bodyPr/>
+                    <a:lstStyle/>
+                    <a:p>
+                      <a:r>
+                        <a:rPr lang="pt-BR" dirty="0"/>
+                        <a:t>Especificação</a:t>
+                      </a:r>
+                    </a:p>
+                  </a:txBody>
+                  <a:tcPr/>
+                </a:tc>
+                <a:extLst>
+                  <a:ext uri="{0D108BD9-81ED-4DB2-BD59-A6C34878D82A}">
+                    <a16:rowId xmlns:a16="http://schemas.microsoft.com/office/drawing/2014/main" val="3451926938"/>
+                  </a:ext>
+                </a:extLst>
+              </a:tr>
+              <a:tr h="2885979">
+                <a:tc>
+                  <a:txBody>
+                    <a:bodyPr/>
+                    <a:lstStyle/>
+                    <a:p>
+                      <a:r>
+                        <a:rPr lang="pt-BR" dirty="0"/>
+                        <a:t>RN14</a:t>
+                      </a:r>
+                    </a:p>
+                  </a:txBody>
+                  <a:tcPr/>
+                </a:tc>
+                <a:tc>
+                  <a:txBody>
+                    <a:bodyPr/>
+                    <a:lstStyle/>
+                    <a:p>
+                      <a:r>
+                        <a:rPr lang="pt-BR" dirty="0"/>
+                        <a:t>Tela Requisição &gt; Status Estoque &gt; </a:t>
+                      </a:r>
+                      <a:r>
+                        <a:rPr lang="pt-BR" dirty="0" err="1"/>
+                        <a:t>ToolTip</a:t>
+                      </a:r>
+                      <a:endParaRPr lang="pt-BR" dirty="0"/>
+                    </a:p>
+                  </a:txBody>
+                  <a:tcPr/>
+                </a:tc>
+                <a:tc>
+                  <a:txBody>
+                    <a:bodyPr/>
+                    <a:lstStyle/>
+                    <a:p>
+                      <a:pPr marL="0" marR="0" lvl="0" indent="0" algn="l" defTabSz="914400" rtl="0" eaLnBrk="1" fontAlgn="auto" latinLnBrk="0" hangingPunct="1">
+                        <a:lnSpc>
+                          <a:spcPct val="100000"/>
+                        </a:lnSpc>
+                        <a:spcBef>
+                          <a:spcPts val="0"/>
+                        </a:spcBef>
+                        <a:spcAft>
+                          <a:spcPts val="0"/>
+                        </a:spcAft>
+                        <a:buClrTx/>
+                        <a:buSzTx/>
+                        <a:buFontTx/>
+                        <a:buNone/>
+                        <a:tabLst/>
+                        <a:defRPr/>
+                      </a:pPr>
+                      <a:r>
+                        <a:rPr lang="pt-BR" dirty="0"/>
+                        <a:t>Ao colocar o mouse sobre o elemento Status Estoque (retângulo) deve ser exibido a legenda a seguir.</a:t>
+                      </a:r>
+                    </a:p>
+                    <a:p>
+                      <a:pPr marL="0" marR="0" lvl="0" indent="0" algn="l" defTabSz="914400" rtl="0" eaLnBrk="1" fontAlgn="auto" latinLnBrk="0" hangingPunct="1">
+                        <a:lnSpc>
+                          <a:spcPct val="100000"/>
+                        </a:lnSpc>
+                        <a:spcBef>
+                          <a:spcPts val="0"/>
+                        </a:spcBef>
+                        <a:spcAft>
+                          <a:spcPts val="0"/>
+                        </a:spcAft>
+                        <a:buClrTx/>
+                        <a:buSzTx/>
+                        <a:buFontTx/>
+                        <a:buNone/>
+                        <a:tabLst/>
+                        <a:defRPr/>
+                      </a:pPr>
+                      <a:endParaRPr lang="pt-BR" dirty="0"/>
+                    </a:p>
+                  </a:txBody>
+                  <a:tcPr/>
+                </a:tc>
+                <a:extLst>
+                  <a:ext uri="{0D108BD9-81ED-4DB2-BD59-A6C34878D82A}">
+                    <a16:rowId xmlns:a16="http://schemas.microsoft.com/office/drawing/2014/main" val="3319175315"/>
+                  </a:ext>
+                </a:extLst>
+              </a:tr>
+            </a:tbl>
+          </a:graphicData>
+        </a:graphic>
+      </p:graphicFrame>
+      <p:pic>
+        <p:nvPicPr>
+          <p:cNvPr id="8" name="Imagem 7">
+            <a:extLst>
+              <a:ext uri="{FF2B5EF4-FFF2-40B4-BE49-F238E27FC236}">
+                <a16:creationId xmlns:a16="http://schemas.microsoft.com/office/drawing/2014/main" id="{FC5439BC-59D0-5F6D-BE51-A82DE0AC90B5}"/>
+              </a:ext>
+            </a:extLst>
+          </p:cNvPr>
+          <p:cNvPicPr>
+            <a:picLocks noChangeAspect="1"/>
+          </p:cNvPicPr>
+          <p:nvPr/>
+        </p:nvPicPr>
+        <p:blipFill rotWithShape="1">
+          <a:blip r:embed="rId2"/>
+          <a:srcRect l="5776" t="36998" r="5251" b="33926"/>
+          <a:stretch/>
+        </p:blipFill>
+        <p:spPr>
+          <a:xfrm>
+            <a:off x="4783016" y="2964804"/>
+            <a:ext cx="5967046" cy="1664678"/>
+          </a:xfrm>
+          <a:prstGeom prst="rect">
+            <a:avLst/>
+          </a:prstGeom>
+        </p:spPr>
+      </p:pic>
+    </p:spTree>
+    <p:extLst>
+      <p:ext uri="{BB962C8B-B14F-4D97-AF65-F5344CB8AC3E}">
+        <p14:creationId xmlns:p14="http://schemas.microsoft.com/office/powerpoint/2010/main" val="1904971298"/>
       </p:ext>
     </p:extLst>
   </p:cSld>

</xml_diff>

<commit_message>
versao nova regra de negocio
</commit_message>
<xml_diff>
--- a/RegrasNegocio/RN_Requisitos.pptx
+++ b/RegrasNegocio/RN_Requisitos.pptx
@@ -13,6 +13,7 @@
     <p:sldId id="260" r:id="rId7"/>
     <p:sldId id="262" r:id="rId8"/>
     <p:sldId id="263" r:id="rId9"/>
+    <p:sldId id="264" r:id="rId10"/>
   </p:sldIdLst>
   <p:sldSz cx="12192000" cy="6858000"/>
   <p:notesSz cx="6858000" cy="9144000"/>
@@ -266,7 +267,7 @@
           <a:p>
             <a:fld id="{0A1764AE-7598-4101-9D63-6EC8D69CE664}" type="datetimeFigureOut">
               <a:rPr lang="pt-BR" smtClean="0"/>
-              <a:t>12/12/2023</a:t>
+              <a:t>15/02/2024</a:t>
             </a:fld>
             <a:endParaRPr lang="pt-BR"/>
           </a:p>
@@ -464,7 +465,7 @@
           <a:p>
             <a:fld id="{0A1764AE-7598-4101-9D63-6EC8D69CE664}" type="datetimeFigureOut">
               <a:rPr lang="pt-BR" smtClean="0"/>
-              <a:t>12/12/2023</a:t>
+              <a:t>15/02/2024</a:t>
             </a:fld>
             <a:endParaRPr lang="pt-BR"/>
           </a:p>
@@ -672,7 +673,7 @@
           <a:p>
             <a:fld id="{0A1764AE-7598-4101-9D63-6EC8D69CE664}" type="datetimeFigureOut">
               <a:rPr lang="pt-BR" smtClean="0"/>
-              <a:t>12/12/2023</a:t>
+              <a:t>15/02/2024</a:t>
             </a:fld>
             <a:endParaRPr lang="pt-BR"/>
           </a:p>
@@ -870,7 +871,7 @@
           <a:p>
             <a:fld id="{0A1764AE-7598-4101-9D63-6EC8D69CE664}" type="datetimeFigureOut">
               <a:rPr lang="pt-BR" smtClean="0"/>
-              <a:t>12/12/2023</a:t>
+              <a:t>15/02/2024</a:t>
             </a:fld>
             <a:endParaRPr lang="pt-BR"/>
           </a:p>
@@ -1145,7 +1146,7 @@
           <a:p>
             <a:fld id="{0A1764AE-7598-4101-9D63-6EC8D69CE664}" type="datetimeFigureOut">
               <a:rPr lang="pt-BR" smtClean="0"/>
-              <a:t>12/12/2023</a:t>
+              <a:t>15/02/2024</a:t>
             </a:fld>
             <a:endParaRPr lang="pt-BR"/>
           </a:p>
@@ -1410,7 +1411,7 @@
           <a:p>
             <a:fld id="{0A1764AE-7598-4101-9D63-6EC8D69CE664}" type="datetimeFigureOut">
               <a:rPr lang="pt-BR" smtClean="0"/>
-              <a:t>12/12/2023</a:t>
+              <a:t>15/02/2024</a:t>
             </a:fld>
             <a:endParaRPr lang="pt-BR"/>
           </a:p>
@@ -1822,7 +1823,7 @@
           <a:p>
             <a:fld id="{0A1764AE-7598-4101-9D63-6EC8D69CE664}" type="datetimeFigureOut">
               <a:rPr lang="pt-BR" smtClean="0"/>
-              <a:t>12/12/2023</a:t>
+              <a:t>15/02/2024</a:t>
             </a:fld>
             <a:endParaRPr lang="pt-BR"/>
           </a:p>
@@ -1963,7 +1964,7 @@
           <a:p>
             <a:fld id="{0A1764AE-7598-4101-9D63-6EC8D69CE664}" type="datetimeFigureOut">
               <a:rPr lang="pt-BR" smtClean="0"/>
-              <a:t>12/12/2023</a:t>
+              <a:t>15/02/2024</a:t>
             </a:fld>
             <a:endParaRPr lang="pt-BR"/>
           </a:p>
@@ -2076,7 +2077,7 @@
           <a:p>
             <a:fld id="{0A1764AE-7598-4101-9D63-6EC8D69CE664}" type="datetimeFigureOut">
               <a:rPr lang="pt-BR" smtClean="0"/>
-              <a:t>12/12/2023</a:t>
+              <a:t>15/02/2024</a:t>
             </a:fld>
             <a:endParaRPr lang="pt-BR"/>
           </a:p>
@@ -2387,7 +2388,7 @@
           <a:p>
             <a:fld id="{0A1764AE-7598-4101-9D63-6EC8D69CE664}" type="datetimeFigureOut">
               <a:rPr lang="pt-BR" smtClean="0"/>
-              <a:t>12/12/2023</a:t>
+              <a:t>15/02/2024</a:t>
             </a:fld>
             <a:endParaRPr lang="pt-BR"/>
           </a:p>
@@ -2675,7 +2676,7 @@
           <a:p>
             <a:fld id="{0A1764AE-7598-4101-9D63-6EC8D69CE664}" type="datetimeFigureOut">
               <a:rPr lang="pt-BR" smtClean="0"/>
-              <a:t>12/12/2023</a:t>
+              <a:t>15/02/2024</a:t>
             </a:fld>
             <a:endParaRPr lang="pt-BR"/>
           </a:p>
@@ -2916,7 +2917,7 @@
           <a:p>
             <a:fld id="{0A1764AE-7598-4101-9D63-6EC8D69CE664}" type="datetimeFigureOut">
               <a:rPr lang="pt-BR" smtClean="0"/>
-              <a:t>12/12/2023</a:t>
+              <a:t>15/02/2024</a:t>
             </a:fld>
             <a:endParaRPr lang="pt-BR"/>
           </a:p>
@@ -3501,10 +3502,10 @@
       </p:grpSpPr>
       <p:pic>
         <p:nvPicPr>
-          <p:cNvPr id="12" name="Imagem 11">
-            <a:extLst>
-              <a:ext uri="{FF2B5EF4-FFF2-40B4-BE49-F238E27FC236}">
-                <a16:creationId xmlns:a16="http://schemas.microsoft.com/office/drawing/2014/main" id="{B1387010-3D59-D652-A29C-C353113D94D7}"/>
+          <p:cNvPr id="3" name="Imagem 2">
+            <a:extLst>
+              <a:ext uri="{FF2B5EF4-FFF2-40B4-BE49-F238E27FC236}">
+                <a16:creationId xmlns:a16="http://schemas.microsoft.com/office/drawing/2014/main" id="{E7EEB2C6-4909-3EA0-4F64-7F0481403E92}"/>
               </a:ext>
             </a:extLst>
           </p:cNvPr>
@@ -3521,8 +3522,8 @@
         </p:blipFill>
         <p:spPr>
           <a:xfrm>
-            <a:off x="899784" y="806749"/>
-            <a:ext cx="6535062" cy="5649113"/>
+            <a:off x="352708" y="782554"/>
+            <a:ext cx="6414787" cy="5528935"/>
           </a:xfrm>
           <a:prstGeom prst="rect">
             <a:avLst/>
@@ -3547,7 +3548,7 @@
         </p:nvSpPr>
         <p:spPr>
           <a:xfrm>
-            <a:off x="581891" y="178130"/>
+            <a:off x="352708" y="196009"/>
             <a:ext cx="10515600" cy="510639"/>
           </a:xfrm>
         </p:spPr>
@@ -4848,7 +4849,7 @@
             <p:ph idx="1"/>
             <p:extLst>
               <p:ext uri="{D42A27DB-BD31-4B8C-83A1-F6EECF244321}">
-                <p14:modId xmlns:p14="http://schemas.microsoft.com/office/powerpoint/2010/main" val="946322543"/>
+                <p14:modId xmlns:p14="http://schemas.microsoft.com/office/powerpoint/2010/main" val="4200369952"/>
               </p:ext>
             </p:extLst>
           </p:nvPr>
@@ -5195,7 +5196,7 @@
                     <a:p>
                       <a:r>
                         <a:rPr lang="pt-BR" dirty="0"/>
-                        <a:t>Tela Requisição &gt; Botão Gravar</a:t>
+                        <a:t>Tela Requisição &gt; Botão Adicionar</a:t>
                       </a:r>
                     </a:p>
                   </a:txBody>
@@ -5322,7 +5323,7 @@
             <p:ph idx="1"/>
             <p:extLst>
               <p:ext uri="{D42A27DB-BD31-4B8C-83A1-F6EECF244321}">
-                <p14:modId xmlns:p14="http://schemas.microsoft.com/office/powerpoint/2010/main" val="1569274692"/>
+                <p14:modId xmlns:p14="http://schemas.microsoft.com/office/powerpoint/2010/main" val="3293262881"/>
               </p:ext>
             </p:extLst>
           </p:nvPr>
@@ -5626,7 +5627,7 @@
         </p:blipFill>
         <p:spPr>
           <a:xfrm>
-            <a:off x="4288327" y="2179007"/>
+            <a:off x="4288327" y="2518977"/>
             <a:ext cx="2018551" cy="683599"/>
           </a:xfrm>
           <a:prstGeom prst="rect">
@@ -5656,7 +5657,7 @@
         </p:blipFill>
         <p:spPr>
           <a:xfrm>
-            <a:off x="6586326" y="2179007"/>
+            <a:off x="6586326" y="2518977"/>
             <a:ext cx="2018551" cy="714904"/>
           </a:xfrm>
           <a:prstGeom prst="rect">
@@ -5686,7 +5687,7 @@
         </p:blipFill>
         <p:spPr>
           <a:xfrm>
-            <a:off x="8784417" y="2188747"/>
+            <a:off x="8784417" y="2528717"/>
             <a:ext cx="2563521" cy="725337"/>
           </a:xfrm>
           <a:prstGeom prst="rect">
@@ -5694,35 +5695,322 @@
           </a:prstGeom>
         </p:spPr>
       </p:pic>
-      <p:pic>
-        <p:nvPicPr>
-          <p:cNvPr id="10" name="Imagem 9">
-            <a:extLst>
-              <a:ext uri="{FF2B5EF4-FFF2-40B4-BE49-F238E27FC236}">
-                <a16:creationId xmlns:a16="http://schemas.microsoft.com/office/drawing/2014/main" id="{7FB24CB0-D72A-3F5A-1F1D-7E04FA297C82}"/>
-              </a:ext>
-            </a:extLst>
-          </p:cNvPr>
-          <p:cNvPicPr>
-            <a:picLocks noChangeAspect="1"/>
-          </p:cNvPicPr>
+      <p:sp>
+        <p:nvSpPr>
+          <p:cNvPr id="8" name="Retângulo 7">
+            <a:extLst>
+              <a:ext uri="{FF2B5EF4-FFF2-40B4-BE49-F238E27FC236}">
+                <a16:creationId xmlns:a16="http://schemas.microsoft.com/office/drawing/2014/main" id="{6489D7B6-9D85-8F85-F616-937759C23E7A}"/>
+              </a:ext>
+            </a:extLst>
+          </p:cNvPr>
+          <p:cNvSpPr/>
           <p:nvPr/>
-        </p:nvPicPr>
-        <p:blipFill rotWithShape="1">
-          <a:blip r:embed="rId5"/>
-          <a:srcRect l="53144" t="40108" r="18309" b="43754"/>
-          <a:stretch/>
-        </p:blipFill>
+        </p:nvSpPr>
         <p:spPr>
           <a:xfrm>
-            <a:off x="5439676" y="4597621"/>
-            <a:ext cx="3344741" cy="1614168"/>
+            <a:off x="5076093" y="4597621"/>
+            <a:ext cx="6021398" cy="1668730"/>
           </a:xfrm>
           <a:prstGeom prst="rect">
             <a:avLst/>
           </a:prstGeom>
+          <a:solidFill>
+            <a:schemeClr val="accent4">
+              <a:lumMod val="40000"/>
+              <a:lumOff val="60000"/>
+            </a:schemeClr>
+          </a:solidFill>
+          <a:ln>
+            <a:noFill/>
+          </a:ln>
         </p:spPr>
-      </p:pic>
+        <p:style>
+          <a:lnRef idx="2">
+            <a:schemeClr val="accent1">
+              <a:shade val="15000"/>
+            </a:schemeClr>
+          </a:lnRef>
+          <a:fillRef idx="1">
+            <a:schemeClr val="accent1"/>
+          </a:fillRef>
+          <a:effectRef idx="0">
+            <a:schemeClr val="accent1"/>
+          </a:effectRef>
+          <a:fontRef idx="minor">
+            <a:schemeClr val="lt1"/>
+          </a:fontRef>
+        </p:style>
+        <p:txBody>
+          <a:bodyPr rtlCol="0" anchor="ctr"/>
+          <a:lstStyle/>
+          <a:p>
+            <a:pPr algn="ctr"/>
+            <a:endParaRPr lang="pt-BR"/>
+          </a:p>
+        </p:txBody>
+      </p:sp>
+      <p:sp>
+        <p:nvSpPr>
+          <p:cNvPr id="9" name="Retângulo 8">
+            <a:extLst>
+              <a:ext uri="{FF2B5EF4-FFF2-40B4-BE49-F238E27FC236}">
+                <a16:creationId xmlns:a16="http://schemas.microsoft.com/office/drawing/2014/main" id="{9E1541ED-84E1-FA18-D007-D216B8016B5C}"/>
+              </a:ext>
+            </a:extLst>
+          </p:cNvPr>
+          <p:cNvSpPr/>
+          <p:nvPr/>
+        </p:nvSpPr>
+        <p:spPr>
+          <a:xfrm>
+            <a:off x="5778526" y="4818365"/>
+            <a:ext cx="317475" cy="279179"/>
+          </a:xfrm>
+          <a:prstGeom prst="rect">
+            <a:avLst/>
+          </a:prstGeom>
+          <a:solidFill>
+            <a:srgbClr val="92D050"/>
+          </a:solidFill>
+          <a:ln>
+            <a:noFill/>
+          </a:ln>
+        </p:spPr>
+        <p:style>
+          <a:lnRef idx="2">
+            <a:schemeClr val="accent1">
+              <a:shade val="15000"/>
+            </a:schemeClr>
+          </a:lnRef>
+          <a:fillRef idx="1">
+            <a:schemeClr val="accent1"/>
+          </a:fillRef>
+          <a:effectRef idx="0">
+            <a:schemeClr val="accent1"/>
+          </a:effectRef>
+          <a:fontRef idx="minor">
+            <a:schemeClr val="lt1"/>
+          </a:fontRef>
+        </p:style>
+        <p:txBody>
+          <a:bodyPr rtlCol="0" anchor="ctr"/>
+          <a:lstStyle/>
+          <a:p>
+            <a:pPr algn="ctr"/>
+            <a:endParaRPr lang="pt-BR"/>
+          </a:p>
+        </p:txBody>
+      </p:sp>
+      <p:sp>
+        <p:nvSpPr>
+          <p:cNvPr id="11" name="Retângulo 10">
+            <a:extLst>
+              <a:ext uri="{FF2B5EF4-FFF2-40B4-BE49-F238E27FC236}">
+                <a16:creationId xmlns:a16="http://schemas.microsoft.com/office/drawing/2014/main" id="{53A3FE43-06F4-078E-B036-5496E86419B2}"/>
+              </a:ext>
+            </a:extLst>
+          </p:cNvPr>
+          <p:cNvSpPr/>
+          <p:nvPr/>
+        </p:nvSpPr>
+        <p:spPr>
+          <a:xfrm>
+            <a:off x="5778526" y="5270308"/>
+            <a:ext cx="317475" cy="279179"/>
+          </a:xfrm>
+          <a:prstGeom prst="rect">
+            <a:avLst/>
+          </a:prstGeom>
+          <a:solidFill>
+            <a:srgbClr val="FFFF00"/>
+          </a:solidFill>
+          <a:ln>
+            <a:noFill/>
+          </a:ln>
+        </p:spPr>
+        <p:style>
+          <a:lnRef idx="2">
+            <a:schemeClr val="accent1">
+              <a:shade val="15000"/>
+            </a:schemeClr>
+          </a:lnRef>
+          <a:fillRef idx="1">
+            <a:schemeClr val="accent1"/>
+          </a:fillRef>
+          <a:effectRef idx="0">
+            <a:schemeClr val="accent1"/>
+          </a:effectRef>
+          <a:fontRef idx="minor">
+            <a:schemeClr val="lt1"/>
+          </a:fontRef>
+        </p:style>
+        <p:txBody>
+          <a:bodyPr rtlCol="0" anchor="ctr"/>
+          <a:lstStyle/>
+          <a:p>
+            <a:pPr algn="ctr"/>
+            <a:endParaRPr lang="pt-BR" dirty="0"/>
+          </a:p>
+        </p:txBody>
+      </p:sp>
+      <p:sp>
+        <p:nvSpPr>
+          <p:cNvPr id="14" name="Retângulo 13">
+            <a:extLst>
+              <a:ext uri="{FF2B5EF4-FFF2-40B4-BE49-F238E27FC236}">
+                <a16:creationId xmlns:a16="http://schemas.microsoft.com/office/drawing/2014/main" id="{324A47AC-2118-C6DF-019B-43C2E694E9B2}"/>
+              </a:ext>
+            </a:extLst>
+          </p:cNvPr>
+          <p:cNvSpPr/>
+          <p:nvPr/>
+        </p:nvSpPr>
+        <p:spPr>
+          <a:xfrm>
+            <a:off x="5778525" y="5749081"/>
+            <a:ext cx="317475" cy="279179"/>
+          </a:xfrm>
+          <a:prstGeom prst="rect">
+            <a:avLst/>
+          </a:prstGeom>
+          <a:solidFill>
+            <a:srgbClr val="C00000"/>
+          </a:solidFill>
+          <a:ln>
+            <a:noFill/>
+          </a:ln>
+        </p:spPr>
+        <p:style>
+          <a:lnRef idx="2">
+            <a:schemeClr val="accent1">
+              <a:shade val="15000"/>
+            </a:schemeClr>
+          </a:lnRef>
+          <a:fillRef idx="1">
+            <a:schemeClr val="accent1"/>
+          </a:fillRef>
+          <a:effectRef idx="0">
+            <a:schemeClr val="accent1"/>
+          </a:effectRef>
+          <a:fontRef idx="minor">
+            <a:schemeClr val="lt1"/>
+          </a:fontRef>
+        </p:style>
+        <p:txBody>
+          <a:bodyPr rtlCol="0" anchor="ctr"/>
+          <a:lstStyle/>
+          <a:p>
+            <a:pPr algn="ctr"/>
+            <a:endParaRPr lang="pt-BR" dirty="0"/>
+          </a:p>
+        </p:txBody>
+      </p:sp>
+      <p:sp>
+        <p:nvSpPr>
+          <p:cNvPr id="15" name="CaixaDeTexto 14">
+            <a:extLst>
+              <a:ext uri="{FF2B5EF4-FFF2-40B4-BE49-F238E27FC236}">
+                <a16:creationId xmlns:a16="http://schemas.microsoft.com/office/drawing/2014/main" id="{411205BE-F162-C635-10F4-3025BC9A1B5D}"/>
+              </a:ext>
+            </a:extLst>
+          </p:cNvPr>
+          <p:cNvSpPr txBox="1"/>
+          <p:nvPr/>
+        </p:nvSpPr>
+        <p:spPr>
+          <a:xfrm>
+            <a:off x="6097922" y="4800298"/>
+            <a:ext cx="4238232" cy="276999"/>
+          </a:xfrm>
+          <a:prstGeom prst="rect">
+            <a:avLst/>
+          </a:prstGeom>
+          <a:noFill/>
+        </p:spPr>
+        <p:txBody>
+          <a:bodyPr wrap="square" rtlCol="0">
+            <a:spAutoFit/>
+          </a:bodyPr>
+          <a:lstStyle/>
+          <a:p>
+            <a:r>
+              <a:rPr lang="pt-BR" sz="1200" dirty="0"/>
+              <a:t>Estoque acima, ou igual de 10% do Estoque mínimo</a:t>
+            </a:r>
+          </a:p>
+        </p:txBody>
+      </p:sp>
+      <p:sp>
+        <p:nvSpPr>
+          <p:cNvPr id="16" name="CaixaDeTexto 15">
+            <a:extLst>
+              <a:ext uri="{FF2B5EF4-FFF2-40B4-BE49-F238E27FC236}">
+                <a16:creationId xmlns:a16="http://schemas.microsoft.com/office/drawing/2014/main" id="{2A31316A-0D3A-28BD-70FC-278592E82051}"/>
+              </a:ext>
+            </a:extLst>
+          </p:cNvPr>
+          <p:cNvSpPr txBox="1"/>
+          <p:nvPr/>
+        </p:nvSpPr>
+        <p:spPr>
+          <a:xfrm>
+            <a:off x="6097922" y="5270308"/>
+            <a:ext cx="4238232" cy="276999"/>
+          </a:xfrm>
+          <a:prstGeom prst="rect">
+            <a:avLst/>
+          </a:prstGeom>
+          <a:noFill/>
+        </p:spPr>
+        <p:txBody>
+          <a:bodyPr wrap="square" rtlCol="0">
+            <a:spAutoFit/>
+          </a:bodyPr>
+          <a:lstStyle/>
+          <a:p>
+            <a:r>
+              <a:rPr lang="pt-BR" sz="1200" dirty="0"/>
+              <a:t>Estoque abaixo de 10% e maior ou igual  que o Estoque mínimo</a:t>
+            </a:r>
+          </a:p>
+        </p:txBody>
+      </p:sp>
+      <p:sp>
+        <p:nvSpPr>
+          <p:cNvPr id="17" name="CaixaDeTexto 16">
+            <a:extLst>
+              <a:ext uri="{FF2B5EF4-FFF2-40B4-BE49-F238E27FC236}">
+                <a16:creationId xmlns:a16="http://schemas.microsoft.com/office/drawing/2014/main" id="{20404D2F-6CA8-12AB-FF6B-744F7D629736}"/>
+              </a:ext>
+            </a:extLst>
+          </p:cNvPr>
+          <p:cNvSpPr txBox="1"/>
+          <p:nvPr/>
+        </p:nvSpPr>
+        <p:spPr>
+          <a:xfrm>
+            <a:off x="6096000" y="5785007"/>
+            <a:ext cx="4238232" cy="276999"/>
+          </a:xfrm>
+          <a:prstGeom prst="rect">
+            <a:avLst/>
+          </a:prstGeom>
+          <a:noFill/>
+        </p:spPr>
+        <p:txBody>
+          <a:bodyPr wrap="square" rtlCol="0">
+            <a:spAutoFit/>
+          </a:bodyPr>
+          <a:lstStyle/>
+          <a:p>
+            <a:r>
+              <a:rPr lang="pt-BR" sz="1200" dirty="0"/>
+              <a:t>Estoque abaixo do Estoque mínimo</a:t>
+            </a:r>
+          </a:p>
+        </p:txBody>
+      </p:sp>
     </p:spTree>
     <p:extLst>
       <p:ext uri="{BB962C8B-B14F-4D97-AF65-F5344CB8AC3E}">
@@ -6009,10 +6297,633 @@
           </a:prstGeom>
         </p:spPr>
       </p:pic>
+      <p:pic>
+        <p:nvPicPr>
+          <p:cNvPr id="3" name="Imagem 2">
+            <a:extLst>
+              <a:ext uri="{FF2B5EF4-FFF2-40B4-BE49-F238E27FC236}">
+                <a16:creationId xmlns:a16="http://schemas.microsoft.com/office/drawing/2014/main" id="{129A93CC-94B0-187E-372C-D567FFA76F86}"/>
+              </a:ext>
+            </a:extLst>
+          </p:cNvPr>
+          <p:cNvPicPr>
+            <a:picLocks noChangeAspect="1"/>
+          </p:cNvPicPr>
+          <p:nvPr/>
+        </p:nvPicPr>
+        <p:blipFill>
+          <a:blip r:embed="rId3"/>
+          <a:stretch>
+            <a:fillRect/>
+          </a:stretch>
+        </p:blipFill>
+        <p:spPr>
+          <a:xfrm>
+            <a:off x="7937811" y="3186718"/>
+            <a:ext cx="3214658" cy="928081"/>
+          </a:xfrm>
+          <a:prstGeom prst="rect">
+            <a:avLst/>
+          </a:prstGeom>
+        </p:spPr>
+      </p:pic>
     </p:spTree>
     <p:extLst>
       <p:ext uri="{BB962C8B-B14F-4D97-AF65-F5344CB8AC3E}">
         <p14:creationId xmlns:p14="http://schemas.microsoft.com/office/powerpoint/2010/main" val="1904971298"/>
+      </p:ext>
+    </p:extLst>
+  </p:cSld>
+  <p:clrMapOvr>
+    <a:masterClrMapping/>
+  </p:clrMapOvr>
+</p:sld>
+</file>
+
+<file path=ppt/slides/slide9.xml><?xml version="1.0" encoding="utf-8"?>
+<p:sld xmlns:a="http://schemas.openxmlformats.org/drawingml/2006/main" xmlns:r="http://schemas.openxmlformats.org/officeDocument/2006/relationships" xmlns:p="http://schemas.openxmlformats.org/presentationml/2006/main">
+  <p:cSld>
+    <p:spTree>
+      <p:nvGrpSpPr>
+        <p:cNvPr id="1" name=""/>
+        <p:cNvGrpSpPr/>
+        <p:nvPr/>
+      </p:nvGrpSpPr>
+      <p:grpSpPr>
+        <a:xfrm>
+          <a:off x="0" y="0"/>
+          <a:ext cx="0" cy="0"/>
+          <a:chOff x="0" y="0"/>
+          <a:chExt cx="0" cy="0"/>
+        </a:xfrm>
+      </p:grpSpPr>
+      <p:sp>
+        <p:nvSpPr>
+          <p:cNvPr id="4" name="Título 3">
+            <a:extLst>
+              <a:ext uri="{FF2B5EF4-FFF2-40B4-BE49-F238E27FC236}">
+                <a16:creationId xmlns:a16="http://schemas.microsoft.com/office/drawing/2014/main" id="{D9304602-DA18-FF79-71A4-C5F27D2DC39F}"/>
+              </a:ext>
+            </a:extLst>
+          </p:cNvPr>
+          <p:cNvSpPr>
+            <a:spLocks noGrp="1"/>
+          </p:cNvSpPr>
+          <p:nvPr>
+            <p:ph type="title"/>
+          </p:nvPr>
+        </p:nvSpPr>
+        <p:spPr>
+          <a:xfrm>
+            <a:off x="581891" y="178130"/>
+            <a:ext cx="10515600" cy="510639"/>
+          </a:xfrm>
+        </p:spPr>
+        <p:txBody>
+          <a:bodyPr>
+            <a:normAutofit fontScale="90000"/>
+          </a:bodyPr>
+          <a:lstStyle/>
+          <a:p>
+            <a:r>
+              <a:rPr lang="pt-BR" dirty="0"/>
+              <a:t>Regras Requisição</a:t>
+            </a:r>
+          </a:p>
+        </p:txBody>
+      </p:sp>
+      <p:graphicFrame>
+        <p:nvGraphicFramePr>
+          <p:cNvPr id="5" name="Espaço Reservado para Conteúdo 4">
+            <a:extLst>
+              <a:ext uri="{FF2B5EF4-FFF2-40B4-BE49-F238E27FC236}">
+                <a16:creationId xmlns:a16="http://schemas.microsoft.com/office/drawing/2014/main" id="{C9B707B6-AC27-6EC3-C992-67D9615B6401}"/>
+              </a:ext>
+            </a:extLst>
+          </p:cNvPr>
+          <p:cNvGraphicFramePr>
+            <a:graphicFrameLocks noGrp="1"/>
+          </p:cNvGraphicFramePr>
+          <p:nvPr>
+            <p:ph idx="1"/>
+            <p:extLst>
+              <p:ext uri="{D42A27DB-BD31-4B8C-83A1-F6EECF244321}">
+                <p14:modId xmlns:p14="http://schemas.microsoft.com/office/powerpoint/2010/main" val="159687340"/>
+              </p:ext>
+            </p:extLst>
+          </p:nvPr>
+        </p:nvGraphicFramePr>
+        <p:xfrm>
+          <a:off x="581891" y="982474"/>
+          <a:ext cx="11329060" cy="5694888"/>
+        </p:xfrm>
+        <a:graphic>
+          <a:graphicData uri="http://schemas.openxmlformats.org/drawingml/2006/table">
+            <a:tbl>
+              <a:tblPr firstRow="1" bandRow="1">
+                <a:tableStyleId>{5C22544A-7EE6-4342-B048-85BDC9FD1C3A}</a:tableStyleId>
+              </a:tblPr>
+              <a:tblGrid>
+                <a:gridCol w="848324">
+                  <a:extLst>
+                    <a:ext uri="{9D8B030D-6E8A-4147-A177-3AD203B41FA5}">
+                      <a16:colId xmlns:a16="http://schemas.microsoft.com/office/drawing/2014/main" val="1575778594"/>
+                    </a:ext>
+                  </a:extLst>
+                </a:gridCol>
+                <a:gridCol w="2485293">
+                  <a:extLst>
+                    <a:ext uri="{9D8B030D-6E8A-4147-A177-3AD203B41FA5}">
+                      <a16:colId xmlns:a16="http://schemas.microsoft.com/office/drawing/2014/main" val="3092702117"/>
+                    </a:ext>
+                  </a:extLst>
+                </a:gridCol>
+                <a:gridCol w="7995443">
+                  <a:extLst>
+                    <a:ext uri="{9D8B030D-6E8A-4147-A177-3AD203B41FA5}">
+                      <a16:colId xmlns:a16="http://schemas.microsoft.com/office/drawing/2014/main" val="1994429329"/>
+                    </a:ext>
+                  </a:extLst>
+                </a:gridCol>
+              </a:tblGrid>
+              <a:tr h="349430">
+                <a:tc>
+                  <a:txBody>
+                    <a:bodyPr/>
+                    <a:lstStyle/>
+                    <a:p>
+                      <a:r>
+                        <a:rPr lang="pt-BR" dirty="0"/>
+                        <a:t>RN</a:t>
+                      </a:r>
+                    </a:p>
+                  </a:txBody>
+                  <a:tcPr/>
+                </a:tc>
+                <a:tc>
+                  <a:txBody>
+                    <a:bodyPr/>
+                    <a:lstStyle/>
+                    <a:p>
+                      <a:r>
+                        <a:rPr lang="pt-BR" dirty="0"/>
+                        <a:t>Localização</a:t>
+                      </a:r>
+                    </a:p>
+                  </a:txBody>
+                  <a:tcPr/>
+                </a:tc>
+                <a:tc>
+                  <a:txBody>
+                    <a:bodyPr/>
+                    <a:lstStyle/>
+                    <a:p>
+                      <a:r>
+                        <a:rPr lang="pt-BR" dirty="0"/>
+                        <a:t>Especificação</a:t>
+                      </a:r>
+                    </a:p>
+                  </a:txBody>
+                  <a:tcPr/>
+                </a:tc>
+                <a:extLst>
+                  <a:ext uri="{0D108BD9-81ED-4DB2-BD59-A6C34878D82A}">
+                    <a16:rowId xmlns:a16="http://schemas.microsoft.com/office/drawing/2014/main" val="3451926938"/>
+                  </a:ext>
+                </a:extLst>
+              </a:tr>
+              <a:tr h="1320726">
+                <a:tc>
+                  <a:txBody>
+                    <a:bodyPr/>
+                    <a:lstStyle/>
+                    <a:p>
+                      <a:r>
+                        <a:rPr lang="pt-BR" dirty="0"/>
+                        <a:t>RN15</a:t>
+                      </a:r>
+                    </a:p>
+                  </a:txBody>
+                  <a:tcPr/>
+                </a:tc>
+                <a:tc>
+                  <a:txBody>
+                    <a:bodyPr/>
+                    <a:lstStyle/>
+                    <a:p>
+                      <a:r>
+                        <a:rPr lang="pt-BR" dirty="0"/>
+                        <a:t>Tela Requisição &gt; Adicionar (ação)</a:t>
+                      </a:r>
+                    </a:p>
+                  </a:txBody>
+                  <a:tcPr/>
+                </a:tc>
+                <a:tc>
+                  <a:txBody>
+                    <a:bodyPr/>
+                    <a:lstStyle/>
+                    <a:p>
+                      <a:pPr marL="0" marR="0" lvl="0" indent="0" algn="l" defTabSz="914400" rtl="0" eaLnBrk="1" fontAlgn="auto" latinLnBrk="0" hangingPunct="1">
+                        <a:lnSpc>
+                          <a:spcPct val="100000"/>
+                        </a:lnSpc>
+                        <a:spcBef>
+                          <a:spcPts val="0"/>
+                        </a:spcBef>
+                        <a:spcAft>
+                          <a:spcPts val="0"/>
+                        </a:spcAft>
+                        <a:buClrTx/>
+                        <a:buSzTx/>
+                        <a:buFontTx/>
+                        <a:buNone/>
+                        <a:tabLst/>
+                        <a:defRPr/>
+                      </a:pPr>
+                      <a:r>
+                        <a:rPr lang="pt-BR" dirty="0"/>
+                        <a:t>Ao clicar no botão adicionar (quando estiver) habilitado, deve ser inserido os dados do Produto na tabela de itens. </a:t>
+                      </a:r>
+                    </a:p>
+                    <a:p>
+                      <a:pPr marL="0" marR="0" lvl="0" indent="0" algn="l" defTabSz="914400" rtl="0" eaLnBrk="1" fontAlgn="auto" latinLnBrk="0" hangingPunct="1">
+                        <a:lnSpc>
+                          <a:spcPct val="100000"/>
+                        </a:lnSpc>
+                        <a:spcBef>
+                          <a:spcPts val="0"/>
+                        </a:spcBef>
+                        <a:spcAft>
+                          <a:spcPts val="0"/>
+                        </a:spcAft>
+                        <a:buClrTx/>
+                        <a:buSzTx/>
+                        <a:buFontTx/>
+                        <a:buNone/>
+                        <a:tabLst/>
+                        <a:defRPr/>
+                      </a:pPr>
+                      <a:r>
+                        <a:rPr lang="pt-BR" dirty="0"/>
+                        <a:t>Os dados dos campos Un., preço, teve ser buscado da tabela de dados fornecidas ou via API.</a:t>
+                      </a:r>
+                    </a:p>
+                    <a:p>
+                      <a:pPr marL="0" marR="0" lvl="0" indent="0" algn="l" defTabSz="914400" rtl="0" eaLnBrk="1" fontAlgn="auto" latinLnBrk="0" hangingPunct="1">
+                        <a:lnSpc>
+                          <a:spcPct val="100000"/>
+                        </a:lnSpc>
+                        <a:spcBef>
+                          <a:spcPts val="0"/>
+                        </a:spcBef>
+                        <a:spcAft>
+                          <a:spcPts val="0"/>
+                        </a:spcAft>
+                        <a:buClrTx/>
+                        <a:buSzTx/>
+                        <a:buFontTx/>
+                        <a:buNone/>
+                        <a:tabLst/>
+                        <a:defRPr/>
+                      </a:pPr>
+                      <a:r>
+                        <a:rPr lang="pt-BR" dirty="0"/>
+                        <a:t>Para cada produto adicionado deve ter o botão Remover. </a:t>
+                      </a:r>
+                    </a:p>
+                  </a:txBody>
+                  <a:tcPr/>
+                </a:tc>
+                <a:extLst>
+                  <a:ext uri="{0D108BD9-81ED-4DB2-BD59-A6C34878D82A}">
+                    <a16:rowId xmlns:a16="http://schemas.microsoft.com/office/drawing/2014/main" val="3319175315"/>
+                  </a:ext>
+                </a:extLst>
+              </a:tr>
+              <a:tr h="705860">
+                <a:tc>
+                  <a:txBody>
+                    <a:bodyPr/>
+                    <a:lstStyle/>
+                    <a:p>
+                      <a:r>
+                        <a:rPr lang="pt-BR" dirty="0"/>
+                        <a:t>RN16</a:t>
+                      </a:r>
+                    </a:p>
+                  </a:txBody>
+                  <a:tcPr/>
+                </a:tc>
+                <a:tc>
+                  <a:txBody>
+                    <a:bodyPr/>
+                    <a:lstStyle/>
+                    <a:p>
+                      <a:r>
+                        <a:rPr lang="pt-BR" dirty="0"/>
+                        <a:t>Tela Requisição &gt; Tabela Itens &gt; Célula Total</a:t>
+                      </a:r>
+                    </a:p>
+                  </a:txBody>
+                  <a:tcPr/>
+                </a:tc>
+                <a:tc>
+                  <a:txBody>
+                    <a:bodyPr/>
+                    <a:lstStyle/>
+                    <a:p>
+                      <a:pPr marL="0" marR="0" lvl="0" indent="0" algn="l" defTabSz="914400" rtl="0" eaLnBrk="1" fontAlgn="auto" latinLnBrk="0" hangingPunct="1">
+                        <a:lnSpc>
+                          <a:spcPct val="100000"/>
+                        </a:lnSpc>
+                        <a:spcBef>
+                          <a:spcPts val="0"/>
+                        </a:spcBef>
+                        <a:spcAft>
+                          <a:spcPts val="0"/>
+                        </a:spcAft>
+                        <a:buClrTx/>
+                        <a:buSzTx/>
+                        <a:buFontTx/>
+                        <a:buNone/>
+                        <a:tabLst/>
+                        <a:defRPr/>
+                      </a:pPr>
+                      <a:r>
+                        <a:rPr lang="pt-BR" dirty="0"/>
+                        <a:t>O sistema deve ser capaz de calcular o Total de cada produto inserido e colocar em sua respectiva célula.</a:t>
+                      </a:r>
+                    </a:p>
+                  </a:txBody>
+                  <a:tcPr/>
+                </a:tc>
+                <a:extLst>
+                  <a:ext uri="{0D108BD9-81ED-4DB2-BD59-A6C34878D82A}">
+                    <a16:rowId xmlns:a16="http://schemas.microsoft.com/office/drawing/2014/main" val="682898447"/>
+                  </a:ext>
+                </a:extLst>
+              </a:tr>
+              <a:tr h="650374">
+                <a:tc>
+                  <a:txBody>
+                    <a:bodyPr/>
+                    <a:lstStyle/>
+                    <a:p>
+                      <a:r>
+                        <a:rPr lang="pt-BR" dirty="0"/>
+                        <a:t>RN17</a:t>
+                      </a:r>
+                    </a:p>
+                  </a:txBody>
+                  <a:tcPr/>
+                </a:tc>
+                <a:tc>
+                  <a:txBody>
+                    <a:bodyPr/>
+                    <a:lstStyle/>
+                    <a:p>
+                      <a:r>
+                        <a:rPr lang="pt-BR" dirty="0"/>
+                        <a:t>Tela Requisição &gt; Tabela Itens &gt; Remover</a:t>
+                      </a:r>
+                    </a:p>
+                  </a:txBody>
+                  <a:tcPr/>
+                </a:tc>
+                <a:tc>
+                  <a:txBody>
+                    <a:bodyPr/>
+                    <a:lstStyle/>
+                    <a:p>
+                      <a:pPr marL="0" marR="0" lvl="0" indent="0" algn="l" defTabSz="914400" rtl="0" eaLnBrk="1" fontAlgn="auto" latinLnBrk="0" hangingPunct="1">
+                        <a:lnSpc>
+                          <a:spcPct val="100000"/>
+                        </a:lnSpc>
+                        <a:spcBef>
+                          <a:spcPts val="0"/>
+                        </a:spcBef>
+                        <a:spcAft>
+                          <a:spcPts val="0"/>
+                        </a:spcAft>
+                        <a:buClrTx/>
+                        <a:buSzTx/>
+                        <a:buFontTx/>
+                        <a:buNone/>
+                        <a:tabLst/>
+                        <a:defRPr/>
+                      </a:pPr>
+                      <a:r>
+                        <a:rPr lang="pt-BR" dirty="0"/>
+                        <a:t>Ao clicar no botão remover a linha da tabela é excluída</a:t>
+                      </a:r>
+                    </a:p>
+                  </a:txBody>
+                  <a:tcPr/>
+                </a:tc>
+                <a:extLst>
+                  <a:ext uri="{0D108BD9-81ED-4DB2-BD59-A6C34878D82A}">
+                    <a16:rowId xmlns:a16="http://schemas.microsoft.com/office/drawing/2014/main" val="2716774740"/>
+                  </a:ext>
+                </a:extLst>
+              </a:tr>
+              <a:tr h="577818">
+                <a:tc>
+                  <a:txBody>
+                    <a:bodyPr/>
+                    <a:lstStyle/>
+                    <a:p>
+                      <a:r>
+                        <a:rPr lang="pt-BR" dirty="0"/>
+                        <a:t>RN18</a:t>
+                      </a:r>
+                    </a:p>
+                  </a:txBody>
+                  <a:tcPr/>
+                </a:tc>
+                <a:tc>
+                  <a:txBody>
+                    <a:bodyPr/>
+                    <a:lstStyle/>
+                    <a:p>
+                      <a:r>
+                        <a:rPr lang="pt-BR" dirty="0"/>
+                        <a:t>Tela Requisição &gt; Tabela Itens &gt; Campo Total</a:t>
+                      </a:r>
+                    </a:p>
+                  </a:txBody>
+                  <a:tcPr/>
+                </a:tc>
+                <a:tc>
+                  <a:txBody>
+                    <a:bodyPr/>
+                    <a:lstStyle/>
+                    <a:p>
+                      <a:pPr marL="0" marR="0" lvl="0" indent="0" algn="l" defTabSz="914400" rtl="0" eaLnBrk="1" fontAlgn="auto" latinLnBrk="0" hangingPunct="1">
+                        <a:lnSpc>
+                          <a:spcPct val="100000"/>
+                        </a:lnSpc>
+                        <a:spcBef>
+                          <a:spcPts val="0"/>
+                        </a:spcBef>
+                        <a:spcAft>
+                          <a:spcPts val="0"/>
+                        </a:spcAft>
+                        <a:buClrTx/>
+                        <a:buSzTx/>
+                        <a:buFontTx/>
+                        <a:buNone/>
+                        <a:tabLst/>
+                        <a:defRPr/>
+                      </a:pPr>
+                      <a:r>
+                        <a:rPr lang="pt-BR" dirty="0"/>
+                        <a:t>O campo total da Requisição deve ser atualizado toda vez que um novo produto for adicionado (somar) e reduzido toda vez que um item for removido da tabela</a:t>
+                      </a:r>
+                    </a:p>
+                  </a:txBody>
+                  <a:tcPr/>
+                </a:tc>
+                <a:extLst>
+                  <a:ext uri="{0D108BD9-81ED-4DB2-BD59-A6C34878D82A}">
+                    <a16:rowId xmlns:a16="http://schemas.microsoft.com/office/drawing/2014/main" val="72693450"/>
+                  </a:ext>
+                </a:extLst>
+              </a:tr>
+              <a:tr h="934887">
+                <a:tc>
+                  <a:txBody>
+                    <a:bodyPr/>
+                    <a:lstStyle/>
+                    <a:p>
+                      <a:r>
+                        <a:rPr lang="pt-BR" dirty="0"/>
+                        <a:t>RN19</a:t>
+                      </a:r>
+                    </a:p>
+                  </a:txBody>
+                  <a:tcPr/>
+                </a:tc>
+                <a:tc>
+                  <a:txBody>
+                    <a:bodyPr/>
+                    <a:lstStyle/>
+                    <a:p>
+                      <a:r>
+                        <a:rPr lang="pt-BR" dirty="0"/>
+                        <a:t>Tela Requisição &gt; Campo Data</a:t>
+                      </a:r>
+                    </a:p>
+                  </a:txBody>
+                  <a:tcPr/>
+                </a:tc>
+                <a:tc>
+                  <a:txBody>
+                    <a:bodyPr/>
+                    <a:lstStyle/>
+                    <a:p>
+                      <a:pPr marL="0" marR="0" lvl="0" indent="0" algn="l" defTabSz="914400" rtl="0" eaLnBrk="1" fontAlgn="auto" latinLnBrk="0" hangingPunct="1">
+                        <a:lnSpc>
+                          <a:spcPct val="100000"/>
+                        </a:lnSpc>
+                        <a:spcBef>
+                          <a:spcPts val="0"/>
+                        </a:spcBef>
+                        <a:spcAft>
+                          <a:spcPts val="0"/>
+                        </a:spcAft>
+                        <a:buClrTx/>
+                        <a:buSzTx/>
+                        <a:buFontTx/>
+                        <a:buNone/>
+                        <a:tabLst/>
+                        <a:defRPr/>
+                      </a:pPr>
+                      <a:r>
+                        <a:rPr lang="pt-BR" dirty="0"/>
+                        <a:t> O campo data de requisição só aceita valores que a data seja igual ou maior que a data atual.</a:t>
+                      </a:r>
+                    </a:p>
+                  </a:txBody>
+                  <a:tcPr/>
+                </a:tc>
+                <a:extLst>
+                  <a:ext uri="{0D108BD9-81ED-4DB2-BD59-A6C34878D82A}">
+                    <a16:rowId xmlns:a16="http://schemas.microsoft.com/office/drawing/2014/main" val="939161319"/>
+                  </a:ext>
+                </a:extLst>
+              </a:tr>
+              <a:tr h="934887">
+                <a:tc>
+                  <a:txBody>
+                    <a:bodyPr/>
+                    <a:lstStyle/>
+                    <a:p>
+                      <a:r>
+                        <a:rPr lang="pt-BR" dirty="0"/>
+                        <a:t>RN20</a:t>
+                      </a:r>
+                    </a:p>
+                  </a:txBody>
+                  <a:tcPr/>
+                </a:tc>
+                <a:tc>
+                  <a:txBody>
+                    <a:bodyPr/>
+                    <a:lstStyle/>
+                    <a:p>
+                      <a:r>
+                        <a:rPr lang="pt-BR" dirty="0"/>
+                        <a:t>Tela Requisição &gt; Layout Responsivo</a:t>
+                      </a:r>
+                    </a:p>
+                  </a:txBody>
+                  <a:tcPr/>
+                </a:tc>
+                <a:tc>
+                  <a:txBody>
+                    <a:bodyPr/>
+                    <a:lstStyle/>
+                    <a:p>
+                      <a:pPr marL="0" marR="0" lvl="0" indent="0" algn="l" defTabSz="914400" rtl="0" eaLnBrk="1" fontAlgn="auto" latinLnBrk="0" hangingPunct="1">
+                        <a:lnSpc>
+                          <a:spcPct val="100000"/>
+                        </a:lnSpc>
+                        <a:spcBef>
+                          <a:spcPts val="0"/>
+                        </a:spcBef>
+                        <a:spcAft>
+                          <a:spcPts val="0"/>
+                        </a:spcAft>
+                        <a:buClrTx/>
+                        <a:buSzTx/>
+                        <a:buFontTx/>
+                        <a:buNone/>
+                        <a:tabLst/>
+                        <a:defRPr/>
+                      </a:pPr>
+                      <a:r>
+                        <a:rPr lang="pt-BR" dirty="0"/>
+                        <a:t>O layout deve ser responsivo, adaptar-se de acordo com o dispositivo.</a:t>
+                      </a:r>
+                    </a:p>
+                  </a:txBody>
+                  <a:tcPr/>
+                </a:tc>
+                <a:extLst>
+                  <a:ext uri="{0D108BD9-81ED-4DB2-BD59-A6C34878D82A}">
+                    <a16:rowId xmlns:a16="http://schemas.microsoft.com/office/drawing/2014/main" val="508722277"/>
+                  </a:ext>
+                </a:extLst>
+              </a:tr>
+            </a:tbl>
+          </a:graphicData>
+        </a:graphic>
+      </p:graphicFrame>
+    </p:spTree>
+    <p:extLst>
+      <p:ext uri="{BB962C8B-B14F-4D97-AF65-F5344CB8AC3E}">
+        <p14:creationId xmlns:p14="http://schemas.microsoft.com/office/powerpoint/2010/main" val="2351563754"/>
       </p:ext>
     </p:extLst>
   </p:cSld>

</xml_diff>